<commit_message>
started processing factor data into modeling data
</commit_message>
<xml_diff>
--- a/factors.pptx
+++ b/factors.pptx
@@ -106,7 +106,7 @@
   </p:defaultTextStyle>
   <p:extLst>
     <p:ext uri="{EFAFB233-063F-42B5-8137-9DF3F51BA10A}">
-      <p15:sldGuideLst xmlns:p15="http://schemas.microsoft.com/office/powerpoint/2012/main" xmlns=""/>
+      <p15:sldGuideLst xmlns="" xmlns:p15="http://schemas.microsoft.com/office/powerpoint/2012/main"/>
     </p:ext>
   </p:extLst>
 </p:presentation>
@@ -1304,42 +1304,6 @@
         </a:p>
       </dgm:t>
     </dgm:pt>
-    <dgm:pt modelId="{7F46ACF6-CFF7-483E-8437-D6501DD735C9}">
-      <dgm:prSet/>
-      <dgm:spPr/>
-      <dgm:t>
-        <a:bodyPr/>
-        <a:lstStyle/>
-        <a:p>
-          <a:r>
-            <a:rPr lang="en-US"/>
-            <a:t>PMI</a:t>
-          </a:r>
-        </a:p>
-      </dgm:t>
-    </dgm:pt>
-    <dgm:pt modelId="{01B93828-B211-4FCF-92FE-46C1C9C80484}" type="parTrans" cxnId="{4A0AC1D1-77A4-4D82-99E3-CBBB22155CA0}">
-      <dgm:prSet/>
-      <dgm:spPr/>
-      <dgm:t>
-        <a:bodyPr/>
-        <a:lstStyle/>
-        <a:p>
-          <a:endParaRPr lang="en-US"/>
-        </a:p>
-      </dgm:t>
-    </dgm:pt>
-    <dgm:pt modelId="{EC5CA40D-E826-4ED4-98C0-9C1F6690156E}" type="sibTrans" cxnId="{4A0AC1D1-77A4-4D82-99E3-CBBB22155CA0}">
-      <dgm:prSet/>
-      <dgm:spPr/>
-      <dgm:t>
-        <a:bodyPr/>
-        <a:lstStyle/>
-        <a:p>
-          <a:endParaRPr lang="en-US"/>
-        </a:p>
-      </dgm:t>
-    </dgm:pt>
     <dgm:pt modelId="{F20C8FF4-9862-4DF9-806F-B90D55ADE098}">
       <dgm:prSet/>
       <dgm:spPr/>
@@ -1464,8 +1428,16 @@
         <a:lstStyle/>
         <a:p>
           <a:r>
-            <a:rPr lang="en-US"/>
-            <a:t>Market sentiment and alternative score</a:t>
+            <a:rPr lang="en-US" dirty="0"/>
+            <a:t>Market </a:t>
+          </a:r>
+          <a:r>
+            <a:rPr lang="en-US" dirty="0" smtClean="0"/>
+            <a:t>sentimental </a:t>
+          </a:r>
+          <a:r>
+            <a:rPr lang="en-US" dirty="0"/>
+            <a:t>and alternative score</a:t>
           </a:r>
         </a:p>
       </dgm:t>
@@ -1554,42 +1526,6 @@
       </dgm:t>
     </dgm:pt>
     <dgm:pt modelId="{0ED44051-871D-48EB-9C9E-EC7E25292212}" type="sibTrans" cxnId="{AD53CAAF-753A-4F5A-9EF0-3CEB2BD42146}">
-      <dgm:prSet/>
-      <dgm:spPr/>
-      <dgm:t>
-        <a:bodyPr/>
-        <a:lstStyle/>
-        <a:p>
-          <a:endParaRPr lang="en-US"/>
-        </a:p>
-      </dgm:t>
-    </dgm:pt>
-    <dgm:pt modelId="{8623E6FC-6F85-40A4-AAE8-EFCDEDF47CC5}">
-      <dgm:prSet/>
-      <dgm:spPr/>
-      <dgm:t>
-        <a:bodyPr/>
-        <a:lstStyle/>
-        <a:p>
-          <a:r>
-            <a:rPr lang="en-US"/>
-            <a:t>Fund flow</a:t>
-          </a:r>
-        </a:p>
-      </dgm:t>
-    </dgm:pt>
-    <dgm:pt modelId="{4EFF8862-D631-4078-B9C3-36D58C0CAF17}" type="parTrans" cxnId="{27CF9016-DB8C-44B5-A21D-7AB07E32C74D}">
-      <dgm:prSet/>
-      <dgm:spPr/>
-      <dgm:t>
-        <a:bodyPr/>
-        <a:lstStyle/>
-        <a:p>
-          <a:endParaRPr lang="en-US"/>
-        </a:p>
-      </dgm:t>
-    </dgm:pt>
-    <dgm:pt modelId="{4D61C86C-F5F3-462F-971D-6C5CAB3AA03F}" type="sibTrans" cxnId="{27CF9016-DB8C-44B5-A21D-7AB07E32C74D}">
       <dgm:prSet/>
       <dgm:spPr/>
       <dgm:t>
@@ -1769,7 +1705,7 @@
       <dgm:spPr/>
     </dgm:pt>
     <dgm:pt modelId="{12C09BAD-4169-4A5B-A324-4C3841F7A0F6}" type="pres">
-      <dgm:prSet presAssocID="{1C58E7D9-DF76-4E55-ADEE-EF79CE6B1872}" presName="Name37" presStyleLbl="parChTrans1D4" presStyleIdx="0" presStyleCnt="13"/>
+      <dgm:prSet presAssocID="{1C58E7D9-DF76-4E55-ADEE-EF79CE6B1872}" presName="Name37" presStyleLbl="parChTrans1D4" presStyleIdx="0" presStyleCnt="11"/>
       <dgm:spPr/>
       <dgm:t>
         <a:bodyPr/>
@@ -1792,7 +1728,7 @@
       <dgm:spPr/>
     </dgm:pt>
     <dgm:pt modelId="{FA45CC20-69B4-4564-A9F3-FECEBCB041D1}" type="pres">
-      <dgm:prSet presAssocID="{3A48E1CA-AC4A-45C6-81B0-46F7E75476EE}" presName="rootText" presStyleLbl="node4" presStyleIdx="0" presStyleCnt="13">
+      <dgm:prSet presAssocID="{3A48E1CA-AC4A-45C6-81B0-46F7E75476EE}" presName="rootText" presStyleLbl="node4" presStyleIdx="0" presStyleCnt="11">
         <dgm:presLayoutVars>
           <dgm:chPref val="3"/>
         </dgm:presLayoutVars>
@@ -1807,7 +1743,7 @@
       </dgm:t>
     </dgm:pt>
     <dgm:pt modelId="{581E77F2-6530-4657-B911-9D5FCFEFE76E}" type="pres">
-      <dgm:prSet presAssocID="{3A48E1CA-AC4A-45C6-81B0-46F7E75476EE}" presName="rootConnector" presStyleLbl="node4" presStyleIdx="0" presStyleCnt="13"/>
+      <dgm:prSet presAssocID="{3A48E1CA-AC4A-45C6-81B0-46F7E75476EE}" presName="rootConnector" presStyleLbl="node4" presStyleIdx="0" presStyleCnt="11"/>
       <dgm:spPr/>
       <dgm:t>
         <a:bodyPr/>
@@ -1826,7 +1762,7 @@
       <dgm:spPr/>
     </dgm:pt>
     <dgm:pt modelId="{6CF77085-0E58-4071-A531-5CE91F8DA348}" type="pres">
-      <dgm:prSet presAssocID="{5FE32230-A646-4579-AA11-A29DF7BEB819}" presName="Name37" presStyleLbl="parChTrans1D4" presStyleIdx="1" presStyleCnt="13"/>
+      <dgm:prSet presAssocID="{5FE32230-A646-4579-AA11-A29DF7BEB819}" presName="Name37" presStyleLbl="parChTrans1D4" presStyleIdx="1" presStyleCnt="11"/>
       <dgm:spPr/>
       <dgm:t>
         <a:bodyPr/>
@@ -1849,7 +1785,7 @@
       <dgm:spPr/>
     </dgm:pt>
     <dgm:pt modelId="{E29314CE-9117-4D7E-8A9F-C2C3B4D6D154}" type="pres">
-      <dgm:prSet presAssocID="{26A2C07E-9DD6-430B-9316-E4F456AF3D58}" presName="rootText" presStyleLbl="node4" presStyleIdx="1" presStyleCnt="13">
+      <dgm:prSet presAssocID="{26A2C07E-9DD6-430B-9316-E4F456AF3D58}" presName="rootText" presStyleLbl="node4" presStyleIdx="1" presStyleCnt="11">
         <dgm:presLayoutVars>
           <dgm:chPref val="3"/>
         </dgm:presLayoutVars>
@@ -1864,7 +1800,7 @@
       </dgm:t>
     </dgm:pt>
     <dgm:pt modelId="{C3400AA3-CE18-4619-AAFF-ABBA4687A208}" type="pres">
-      <dgm:prSet presAssocID="{26A2C07E-9DD6-430B-9316-E4F456AF3D58}" presName="rootConnector" presStyleLbl="node4" presStyleIdx="1" presStyleCnt="13"/>
+      <dgm:prSet presAssocID="{26A2C07E-9DD6-430B-9316-E4F456AF3D58}" presName="rootConnector" presStyleLbl="node4" presStyleIdx="1" presStyleCnt="11"/>
       <dgm:spPr/>
       <dgm:t>
         <a:bodyPr/>
@@ -1940,7 +1876,7 @@
       <dgm:spPr/>
     </dgm:pt>
     <dgm:pt modelId="{CF3C7871-4303-48A3-BB4A-7A86D6B4721D}" type="pres">
-      <dgm:prSet presAssocID="{A8E88150-2DB6-46FA-A852-43051AFC02CB}" presName="Name37" presStyleLbl="parChTrans1D4" presStyleIdx="2" presStyleCnt="13"/>
+      <dgm:prSet presAssocID="{A8E88150-2DB6-46FA-A852-43051AFC02CB}" presName="Name37" presStyleLbl="parChTrans1D4" presStyleIdx="2" presStyleCnt="11"/>
       <dgm:spPr/>
       <dgm:t>
         <a:bodyPr/>
@@ -1963,7 +1899,7 @@
       <dgm:spPr/>
     </dgm:pt>
     <dgm:pt modelId="{1A858DA5-A289-4A22-B794-D6D770901C98}" type="pres">
-      <dgm:prSet presAssocID="{5DBC26DE-3F6D-4591-B844-2BDA42210872}" presName="rootText" presStyleLbl="node4" presStyleIdx="2" presStyleCnt="13">
+      <dgm:prSet presAssocID="{5DBC26DE-3F6D-4591-B844-2BDA42210872}" presName="rootText" presStyleLbl="node4" presStyleIdx="2" presStyleCnt="11">
         <dgm:presLayoutVars>
           <dgm:chPref val="3"/>
         </dgm:presLayoutVars>
@@ -1978,7 +1914,7 @@
       </dgm:t>
     </dgm:pt>
     <dgm:pt modelId="{AEA55E03-C54A-4EA4-9BDB-2776081E2FA7}" type="pres">
-      <dgm:prSet presAssocID="{5DBC26DE-3F6D-4591-B844-2BDA42210872}" presName="rootConnector" presStyleLbl="node4" presStyleIdx="2" presStyleCnt="13"/>
+      <dgm:prSet presAssocID="{5DBC26DE-3F6D-4591-B844-2BDA42210872}" presName="rootConnector" presStyleLbl="node4" presStyleIdx="2" presStyleCnt="11"/>
       <dgm:spPr/>
       <dgm:t>
         <a:bodyPr/>
@@ -1997,7 +1933,7 @@
       <dgm:spPr/>
     </dgm:pt>
     <dgm:pt modelId="{3DEBF5CE-5AAD-47A7-BA08-04DF2AC62CDD}" type="pres">
-      <dgm:prSet presAssocID="{918282B8-17D7-4E07-986D-BDC37D84C030}" presName="Name37" presStyleLbl="parChTrans1D4" presStyleIdx="3" presStyleCnt="13"/>
+      <dgm:prSet presAssocID="{918282B8-17D7-4E07-986D-BDC37D84C030}" presName="Name37" presStyleLbl="parChTrans1D4" presStyleIdx="3" presStyleCnt="11"/>
       <dgm:spPr/>
       <dgm:t>
         <a:bodyPr/>
@@ -2020,7 +1956,7 @@
       <dgm:spPr/>
     </dgm:pt>
     <dgm:pt modelId="{43564767-2DAF-4E04-9A8E-DD1E3F8D8AE9}" type="pres">
-      <dgm:prSet presAssocID="{3D0AB795-C8F5-410B-8C70-7E70771A456A}" presName="rootText" presStyleLbl="node4" presStyleIdx="3" presStyleCnt="13">
+      <dgm:prSet presAssocID="{3D0AB795-C8F5-410B-8C70-7E70771A456A}" presName="rootText" presStyleLbl="node4" presStyleIdx="3" presStyleCnt="11">
         <dgm:presLayoutVars>
           <dgm:chPref val="3"/>
         </dgm:presLayoutVars>
@@ -2035,7 +1971,7 @@
       </dgm:t>
     </dgm:pt>
     <dgm:pt modelId="{EEE5D1A4-30A3-479F-8F91-9D27C0765055}" type="pres">
-      <dgm:prSet presAssocID="{3D0AB795-C8F5-410B-8C70-7E70771A456A}" presName="rootConnector" presStyleLbl="node4" presStyleIdx="3" presStyleCnt="13"/>
+      <dgm:prSet presAssocID="{3D0AB795-C8F5-410B-8C70-7E70771A456A}" presName="rootConnector" presStyleLbl="node4" presStyleIdx="3" presStyleCnt="11"/>
       <dgm:spPr/>
       <dgm:t>
         <a:bodyPr/>
@@ -2054,7 +1990,7 @@
       <dgm:spPr/>
     </dgm:pt>
     <dgm:pt modelId="{AEE27075-2A19-4E8B-B9FC-003EACF0E2C9}" type="pres">
-      <dgm:prSet presAssocID="{09180BF8-9BB0-4837-87C9-A31B615AF06B}" presName="Name37" presStyleLbl="parChTrans1D4" presStyleIdx="4" presStyleCnt="13"/>
+      <dgm:prSet presAssocID="{09180BF8-9BB0-4837-87C9-A31B615AF06B}" presName="Name37" presStyleLbl="parChTrans1D4" presStyleIdx="4" presStyleCnt="11"/>
       <dgm:spPr/>
       <dgm:t>
         <a:bodyPr/>
@@ -2077,7 +2013,7 @@
       <dgm:spPr/>
     </dgm:pt>
     <dgm:pt modelId="{AE0F1FAB-E4F7-460E-B74D-9734E7275AB6}" type="pres">
-      <dgm:prSet presAssocID="{8B766CED-AF48-4A51-AFEA-B506C25FF9CE}" presName="rootText" presStyleLbl="node4" presStyleIdx="4" presStyleCnt="13">
+      <dgm:prSet presAssocID="{8B766CED-AF48-4A51-AFEA-B506C25FF9CE}" presName="rootText" presStyleLbl="node4" presStyleIdx="4" presStyleCnt="11">
         <dgm:presLayoutVars>
           <dgm:chPref val="3"/>
         </dgm:presLayoutVars>
@@ -2092,7 +2028,7 @@
       </dgm:t>
     </dgm:pt>
     <dgm:pt modelId="{E1E4BAA3-2C9C-4F78-9729-B712AC892362}" type="pres">
-      <dgm:prSet presAssocID="{8B766CED-AF48-4A51-AFEA-B506C25FF9CE}" presName="rootConnector" presStyleLbl="node4" presStyleIdx="4" presStyleCnt="13"/>
+      <dgm:prSet presAssocID="{8B766CED-AF48-4A51-AFEA-B506C25FF9CE}" presName="rootConnector" presStyleLbl="node4" presStyleIdx="4" presStyleCnt="11"/>
       <dgm:spPr/>
       <dgm:t>
         <a:bodyPr/>
@@ -2111,7 +2047,7 @@
       <dgm:spPr/>
     </dgm:pt>
     <dgm:pt modelId="{71C08850-6C20-40D7-86A2-D9FD0A3CCF87}" type="pres">
-      <dgm:prSet presAssocID="{63B6199B-540A-42F9-8A18-8DFF59807143}" presName="Name37" presStyleLbl="parChTrans1D4" presStyleIdx="5" presStyleCnt="13"/>
+      <dgm:prSet presAssocID="{63B6199B-540A-42F9-8A18-8DFF59807143}" presName="Name37" presStyleLbl="parChTrans1D4" presStyleIdx="5" presStyleCnt="11"/>
       <dgm:spPr/>
       <dgm:t>
         <a:bodyPr/>
@@ -2134,7 +2070,7 @@
       <dgm:spPr/>
     </dgm:pt>
     <dgm:pt modelId="{52565F71-66FC-45DF-AB63-8158775C40A3}" type="pres">
-      <dgm:prSet presAssocID="{A57537C8-D3B4-4574-A41F-A2E2552D7B2A}" presName="rootText" presStyleLbl="node4" presStyleIdx="5" presStyleCnt="13">
+      <dgm:prSet presAssocID="{A57537C8-D3B4-4574-A41F-A2E2552D7B2A}" presName="rootText" presStyleLbl="node4" presStyleIdx="5" presStyleCnt="11">
         <dgm:presLayoutVars>
           <dgm:chPref val="3"/>
         </dgm:presLayoutVars>
@@ -2149,7 +2085,7 @@
       </dgm:t>
     </dgm:pt>
     <dgm:pt modelId="{82F11D74-D82B-4C81-BA30-AF919B5FCD5E}" type="pres">
-      <dgm:prSet presAssocID="{A57537C8-D3B4-4574-A41F-A2E2552D7B2A}" presName="rootConnector" presStyleLbl="node4" presStyleIdx="5" presStyleCnt="13"/>
+      <dgm:prSet presAssocID="{A57537C8-D3B4-4574-A41F-A2E2552D7B2A}" presName="rootConnector" presStyleLbl="node4" presStyleIdx="5" presStyleCnt="11"/>
       <dgm:spPr/>
       <dgm:t>
         <a:bodyPr/>
@@ -2224,65 +2160,8 @@
       <dgm:prSet presAssocID="{CBF0074A-0FC7-4077-BCF9-CEB59150AFC8}" presName="hierChild4" presStyleCnt="0"/>
       <dgm:spPr/>
     </dgm:pt>
-    <dgm:pt modelId="{F2A0CB5F-BBE7-4880-9B72-74572386B4E4}" type="pres">
-      <dgm:prSet presAssocID="{01B93828-B211-4FCF-92FE-46C1C9C80484}" presName="Name37" presStyleLbl="parChTrans1D4" presStyleIdx="6" presStyleCnt="13"/>
-      <dgm:spPr/>
-      <dgm:t>
-        <a:bodyPr/>
-        <a:lstStyle/>
-        <a:p>
-          <a:endParaRPr lang="en-US"/>
-        </a:p>
-      </dgm:t>
-    </dgm:pt>
-    <dgm:pt modelId="{E5BE672B-1C01-44E8-9372-9E496F99BF39}" type="pres">
-      <dgm:prSet presAssocID="{7F46ACF6-CFF7-483E-8437-D6501DD735C9}" presName="hierRoot2" presStyleCnt="0">
-        <dgm:presLayoutVars>
-          <dgm:hierBranch val="init"/>
-        </dgm:presLayoutVars>
-      </dgm:prSet>
-      <dgm:spPr/>
-    </dgm:pt>
-    <dgm:pt modelId="{EC2DD0CB-133C-4BB4-B3D1-1A473B8B3161}" type="pres">
-      <dgm:prSet presAssocID="{7F46ACF6-CFF7-483E-8437-D6501DD735C9}" presName="rootComposite" presStyleCnt="0"/>
-      <dgm:spPr/>
-    </dgm:pt>
-    <dgm:pt modelId="{FF3BFF33-8FD3-4579-94E9-E5FEBB720C18}" type="pres">
-      <dgm:prSet presAssocID="{7F46ACF6-CFF7-483E-8437-D6501DD735C9}" presName="rootText" presStyleLbl="node4" presStyleIdx="6" presStyleCnt="13">
-        <dgm:presLayoutVars>
-          <dgm:chPref val="3"/>
-        </dgm:presLayoutVars>
-      </dgm:prSet>
-      <dgm:spPr/>
-      <dgm:t>
-        <a:bodyPr/>
-        <a:lstStyle/>
-        <a:p>
-          <a:endParaRPr lang="en-US"/>
-        </a:p>
-      </dgm:t>
-    </dgm:pt>
-    <dgm:pt modelId="{FD456E50-5289-4FBB-BB08-49EC87D76EBD}" type="pres">
-      <dgm:prSet presAssocID="{7F46ACF6-CFF7-483E-8437-D6501DD735C9}" presName="rootConnector" presStyleLbl="node4" presStyleIdx="6" presStyleCnt="13"/>
-      <dgm:spPr/>
-      <dgm:t>
-        <a:bodyPr/>
-        <a:lstStyle/>
-        <a:p>
-          <a:endParaRPr lang="en-US"/>
-        </a:p>
-      </dgm:t>
-    </dgm:pt>
-    <dgm:pt modelId="{7ACC8D40-57CC-4818-8F00-A0014A9C7EA5}" type="pres">
-      <dgm:prSet presAssocID="{7F46ACF6-CFF7-483E-8437-D6501DD735C9}" presName="hierChild4" presStyleCnt="0"/>
-      <dgm:spPr/>
-    </dgm:pt>
-    <dgm:pt modelId="{0845DDA4-9063-4746-93ED-D1D1B1C81886}" type="pres">
-      <dgm:prSet presAssocID="{7F46ACF6-CFF7-483E-8437-D6501DD735C9}" presName="hierChild5" presStyleCnt="0"/>
-      <dgm:spPr/>
-    </dgm:pt>
     <dgm:pt modelId="{4FC84424-77B3-4BAD-A376-197D931F1926}" type="pres">
-      <dgm:prSet presAssocID="{5452ED12-D44F-4B0C-85CC-760D8ED00141}" presName="Name37" presStyleLbl="parChTrans1D4" presStyleIdx="7" presStyleCnt="13"/>
+      <dgm:prSet presAssocID="{5452ED12-D44F-4B0C-85CC-760D8ED00141}" presName="Name37" presStyleLbl="parChTrans1D4" presStyleIdx="6" presStyleCnt="11"/>
       <dgm:spPr/>
       <dgm:t>
         <a:bodyPr/>
@@ -2305,7 +2184,7 @@
       <dgm:spPr/>
     </dgm:pt>
     <dgm:pt modelId="{A2C33C9F-E20E-4D1E-BBFD-28AA5D38E75F}" type="pres">
-      <dgm:prSet presAssocID="{F20C8FF4-9862-4DF9-806F-B90D55ADE098}" presName="rootText" presStyleLbl="node4" presStyleIdx="7" presStyleCnt="13">
+      <dgm:prSet presAssocID="{F20C8FF4-9862-4DF9-806F-B90D55ADE098}" presName="rootText" presStyleLbl="node4" presStyleIdx="6" presStyleCnt="11">
         <dgm:presLayoutVars>
           <dgm:chPref val="3"/>
         </dgm:presLayoutVars>
@@ -2320,7 +2199,7 @@
       </dgm:t>
     </dgm:pt>
     <dgm:pt modelId="{62B8E97A-45F3-49CB-8798-FCFDBA6EB4CE}" type="pres">
-      <dgm:prSet presAssocID="{F20C8FF4-9862-4DF9-806F-B90D55ADE098}" presName="rootConnector" presStyleLbl="node4" presStyleIdx="7" presStyleCnt="13"/>
+      <dgm:prSet presAssocID="{F20C8FF4-9862-4DF9-806F-B90D55ADE098}" presName="rootConnector" presStyleLbl="node4" presStyleIdx="6" presStyleCnt="11"/>
       <dgm:spPr/>
       <dgm:t>
         <a:bodyPr/>
@@ -2339,7 +2218,7 @@
       <dgm:spPr/>
     </dgm:pt>
     <dgm:pt modelId="{15A61DF0-AC49-4E69-9546-90778A86DEB3}" type="pres">
-      <dgm:prSet presAssocID="{76085044-8EBB-4871-88EA-33CBECC08835}" presName="Name37" presStyleLbl="parChTrans1D4" presStyleIdx="8" presStyleCnt="13"/>
+      <dgm:prSet presAssocID="{76085044-8EBB-4871-88EA-33CBECC08835}" presName="Name37" presStyleLbl="parChTrans1D4" presStyleIdx="7" presStyleCnt="11"/>
       <dgm:spPr/>
       <dgm:t>
         <a:bodyPr/>
@@ -2362,7 +2241,7 @@
       <dgm:spPr/>
     </dgm:pt>
     <dgm:pt modelId="{BEB8562A-B0BC-4237-ADB8-FF4D03EEE094}" type="pres">
-      <dgm:prSet presAssocID="{3FA2808F-BB87-4A68-8BE2-20841C7DF183}" presName="rootText" presStyleLbl="node4" presStyleIdx="8" presStyleCnt="13">
+      <dgm:prSet presAssocID="{3FA2808F-BB87-4A68-8BE2-20841C7DF183}" presName="rootText" presStyleLbl="node4" presStyleIdx="7" presStyleCnt="11">
         <dgm:presLayoutVars>
           <dgm:chPref val="3"/>
         </dgm:presLayoutVars>
@@ -2377,7 +2256,7 @@
       </dgm:t>
     </dgm:pt>
     <dgm:pt modelId="{853316CE-83C9-44FB-9CD1-461AD4922901}" type="pres">
-      <dgm:prSet presAssocID="{3FA2808F-BB87-4A68-8BE2-20841C7DF183}" presName="rootConnector" presStyleLbl="node4" presStyleIdx="8" presStyleCnt="13"/>
+      <dgm:prSet presAssocID="{3FA2808F-BB87-4A68-8BE2-20841C7DF183}" presName="rootConnector" presStyleLbl="node4" presStyleIdx="7" presStyleCnt="11"/>
       <dgm:spPr/>
       <dgm:t>
         <a:bodyPr/>
@@ -2396,7 +2275,7 @@
       <dgm:spPr/>
     </dgm:pt>
     <dgm:pt modelId="{FA1C85F5-EB77-4684-8A8B-A31BFC407067}" type="pres">
-      <dgm:prSet presAssocID="{745DD6E8-C64C-4AE8-A101-F8AD12DE56B3}" presName="Name37" presStyleLbl="parChTrans1D4" presStyleIdx="9" presStyleCnt="13"/>
+      <dgm:prSet presAssocID="{745DD6E8-C64C-4AE8-A101-F8AD12DE56B3}" presName="Name37" presStyleLbl="parChTrans1D4" presStyleIdx="8" presStyleCnt="11"/>
       <dgm:spPr/>
       <dgm:t>
         <a:bodyPr/>
@@ -2419,7 +2298,7 @@
       <dgm:spPr/>
     </dgm:pt>
     <dgm:pt modelId="{D441324F-5840-4545-95C8-58993D682F03}" type="pres">
-      <dgm:prSet presAssocID="{822D2ADF-B5A2-4854-B448-654CBB195991}" presName="rootText" presStyleLbl="node4" presStyleIdx="9" presStyleCnt="13">
+      <dgm:prSet presAssocID="{822D2ADF-B5A2-4854-B448-654CBB195991}" presName="rootText" presStyleLbl="node4" presStyleIdx="8" presStyleCnt="11">
         <dgm:presLayoutVars>
           <dgm:chPref val="3"/>
         </dgm:presLayoutVars>
@@ -2434,7 +2313,7 @@
       </dgm:t>
     </dgm:pt>
     <dgm:pt modelId="{4B05AF45-3B20-4BCF-B0B2-1C0BE009630D}" type="pres">
-      <dgm:prSet presAssocID="{822D2ADF-B5A2-4854-B448-654CBB195991}" presName="rootConnector" presStyleLbl="node4" presStyleIdx="9" presStyleCnt="13"/>
+      <dgm:prSet presAssocID="{822D2ADF-B5A2-4854-B448-654CBB195991}" presName="rootConnector" presStyleLbl="node4" presStyleIdx="8" presStyleCnt="11"/>
       <dgm:spPr/>
       <dgm:t>
         <a:bodyPr/>
@@ -2510,7 +2389,7 @@
       <dgm:spPr/>
     </dgm:pt>
     <dgm:pt modelId="{71C01193-494F-4E8F-8F6B-2A092BF6A52A}" type="pres">
-      <dgm:prSet presAssocID="{A02E4216-9295-4A98-B25D-724EEEACEB86}" presName="Name37" presStyleLbl="parChTrans1D4" presStyleIdx="10" presStyleCnt="13"/>
+      <dgm:prSet presAssocID="{A02E4216-9295-4A98-B25D-724EEEACEB86}" presName="Name37" presStyleLbl="parChTrans1D4" presStyleIdx="9" presStyleCnt="11"/>
       <dgm:spPr/>
       <dgm:t>
         <a:bodyPr/>
@@ -2533,7 +2412,7 @@
       <dgm:spPr/>
     </dgm:pt>
     <dgm:pt modelId="{13A484D3-7D69-43DA-A929-94F88FBBE4FD}" type="pres">
-      <dgm:prSet presAssocID="{6B14FCA3-6FEA-43EB-9C82-2B07D04536C7}" presName="rootText" presStyleLbl="node4" presStyleIdx="10" presStyleCnt="13">
+      <dgm:prSet presAssocID="{6B14FCA3-6FEA-43EB-9C82-2B07D04536C7}" presName="rootText" presStyleLbl="node4" presStyleIdx="9" presStyleCnt="11">
         <dgm:presLayoutVars>
           <dgm:chPref val="3"/>
         </dgm:presLayoutVars>
@@ -2548,7 +2427,7 @@
       </dgm:t>
     </dgm:pt>
     <dgm:pt modelId="{0C07F64B-E45F-43F5-B234-4C17D121787E}" type="pres">
-      <dgm:prSet presAssocID="{6B14FCA3-6FEA-43EB-9C82-2B07D04536C7}" presName="rootConnector" presStyleLbl="node4" presStyleIdx="10" presStyleCnt="13"/>
+      <dgm:prSet presAssocID="{6B14FCA3-6FEA-43EB-9C82-2B07D04536C7}" presName="rootConnector" presStyleLbl="node4" presStyleIdx="9" presStyleCnt="11"/>
       <dgm:spPr/>
       <dgm:t>
         <a:bodyPr/>
@@ -2567,7 +2446,7 @@
       <dgm:spPr/>
     </dgm:pt>
     <dgm:pt modelId="{5D5F107F-E70D-4FA0-826E-585751096CDC}" type="pres">
-      <dgm:prSet presAssocID="{E3EA836E-DABB-4A96-B743-CFF4C64EB46F}" presName="Name37" presStyleLbl="parChTrans1D4" presStyleIdx="11" presStyleCnt="13"/>
+      <dgm:prSet presAssocID="{E3EA836E-DABB-4A96-B743-CFF4C64EB46F}" presName="Name37" presStyleLbl="parChTrans1D4" presStyleIdx="10" presStyleCnt="11"/>
       <dgm:spPr/>
       <dgm:t>
         <a:bodyPr/>
@@ -2590,7 +2469,7 @@
       <dgm:spPr/>
     </dgm:pt>
     <dgm:pt modelId="{A541300C-4EA0-4F2F-A86D-61A27E02B787}" type="pres">
-      <dgm:prSet presAssocID="{3045F83C-2937-4C11-A432-105F2D7F79C8}" presName="rootText" presStyleLbl="node4" presStyleIdx="11" presStyleCnt="13">
+      <dgm:prSet presAssocID="{3045F83C-2937-4C11-A432-105F2D7F79C8}" presName="rootText" presStyleLbl="node4" presStyleIdx="10" presStyleCnt="11">
         <dgm:presLayoutVars>
           <dgm:chPref val="3"/>
         </dgm:presLayoutVars>
@@ -2605,7 +2484,7 @@
       </dgm:t>
     </dgm:pt>
     <dgm:pt modelId="{CFF27639-2EAA-4E02-8133-52CB55E04712}" type="pres">
-      <dgm:prSet presAssocID="{3045F83C-2937-4C11-A432-105F2D7F79C8}" presName="rootConnector" presStyleLbl="node4" presStyleIdx="11" presStyleCnt="13"/>
+      <dgm:prSet presAssocID="{3045F83C-2937-4C11-A432-105F2D7F79C8}" presName="rootConnector" presStyleLbl="node4" presStyleIdx="10" presStyleCnt="11"/>
       <dgm:spPr/>
       <dgm:t>
         <a:bodyPr/>
@@ -2621,63 +2500,6 @@
     </dgm:pt>
     <dgm:pt modelId="{7EDBF25C-4307-428E-8778-7B10CE86AE58}" type="pres">
       <dgm:prSet presAssocID="{3045F83C-2937-4C11-A432-105F2D7F79C8}" presName="hierChild5" presStyleCnt="0"/>
-      <dgm:spPr/>
-    </dgm:pt>
-    <dgm:pt modelId="{B2E63F28-B523-474D-ADDF-A821FF109D32}" type="pres">
-      <dgm:prSet presAssocID="{4EFF8862-D631-4078-B9C3-36D58C0CAF17}" presName="Name37" presStyleLbl="parChTrans1D4" presStyleIdx="12" presStyleCnt="13"/>
-      <dgm:spPr/>
-      <dgm:t>
-        <a:bodyPr/>
-        <a:lstStyle/>
-        <a:p>
-          <a:endParaRPr lang="en-US"/>
-        </a:p>
-      </dgm:t>
-    </dgm:pt>
-    <dgm:pt modelId="{D2C744F3-EB1E-4086-A394-3B3EDCDF9CD9}" type="pres">
-      <dgm:prSet presAssocID="{8623E6FC-6F85-40A4-AAE8-EFCDEDF47CC5}" presName="hierRoot2" presStyleCnt="0">
-        <dgm:presLayoutVars>
-          <dgm:hierBranch val="init"/>
-        </dgm:presLayoutVars>
-      </dgm:prSet>
-      <dgm:spPr/>
-    </dgm:pt>
-    <dgm:pt modelId="{485AC56D-E0CA-44C9-9D69-E8C128CCF951}" type="pres">
-      <dgm:prSet presAssocID="{8623E6FC-6F85-40A4-AAE8-EFCDEDF47CC5}" presName="rootComposite" presStyleCnt="0"/>
-      <dgm:spPr/>
-    </dgm:pt>
-    <dgm:pt modelId="{7ED97DFD-2695-4177-9E52-49490FD3D0C7}" type="pres">
-      <dgm:prSet presAssocID="{8623E6FC-6F85-40A4-AAE8-EFCDEDF47CC5}" presName="rootText" presStyleLbl="node4" presStyleIdx="12" presStyleCnt="13">
-        <dgm:presLayoutVars>
-          <dgm:chPref val="3"/>
-        </dgm:presLayoutVars>
-      </dgm:prSet>
-      <dgm:spPr/>
-      <dgm:t>
-        <a:bodyPr/>
-        <a:lstStyle/>
-        <a:p>
-          <a:endParaRPr lang="en-US"/>
-        </a:p>
-      </dgm:t>
-    </dgm:pt>
-    <dgm:pt modelId="{C1A60573-4E66-4FDF-A280-B2DC513766E5}" type="pres">
-      <dgm:prSet presAssocID="{8623E6FC-6F85-40A4-AAE8-EFCDEDF47CC5}" presName="rootConnector" presStyleLbl="node4" presStyleIdx="12" presStyleCnt="13"/>
-      <dgm:spPr/>
-      <dgm:t>
-        <a:bodyPr/>
-        <a:lstStyle/>
-        <a:p>
-          <a:endParaRPr lang="en-US"/>
-        </a:p>
-      </dgm:t>
-    </dgm:pt>
-    <dgm:pt modelId="{0F053D99-DF21-42A0-9C10-E845D7419C35}" type="pres">
-      <dgm:prSet presAssocID="{8623E6FC-6F85-40A4-AAE8-EFCDEDF47CC5}" presName="hierChild4" presStyleCnt="0"/>
-      <dgm:spPr/>
-    </dgm:pt>
-    <dgm:pt modelId="{A9A38BEE-B6E3-4814-BF59-2B5E93418BE9}" type="pres">
-      <dgm:prSet presAssocID="{8623E6FC-6F85-40A4-AAE8-EFCDEDF47CC5}" presName="hierChild5" presStyleCnt="0"/>
       <dgm:spPr/>
     </dgm:pt>
     <dgm:pt modelId="{278C60CD-FD00-4CA7-9D49-CB1F6E333D23}" type="pres">
@@ -2705,50 +2527,44 @@
     <dgm:cxn modelId="{32962C06-0B23-416A-98DD-A6F196B66601}" type="presOf" srcId="{6F49CECE-5543-4B62-B83F-169C4977D00E}" destId="{186C055C-21B4-48A8-BC26-65AAD2880EBF}" srcOrd="0" destOrd="0" presId="urn:microsoft.com/office/officeart/2005/8/layout/orgChart1"/>
     <dgm:cxn modelId="{4FAD2A76-771E-4A6F-8072-E25C52A02D4B}" type="presOf" srcId="{3A48E1CA-AC4A-45C6-81B0-46F7E75476EE}" destId="{FA45CC20-69B4-4564-A9F3-FECEBCB041D1}" srcOrd="0" destOrd="0" presId="urn:microsoft.com/office/officeart/2005/8/layout/orgChart1"/>
     <dgm:cxn modelId="{77A5D652-EEE2-4A52-9044-EE597ACB2DEF}" srcId="{F7CD38E5-D80E-47CE-9C8A-C1EC4A123AAB}" destId="{6B14FCA3-6FEA-43EB-9C82-2B07D04536C7}" srcOrd="0" destOrd="0" parTransId="{A02E4216-9295-4A98-B25D-724EEEACEB86}" sibTransId="{165FECF0-A90A-46CC-9536-1B21943DDB74}"/>
-    <dgm:cxn modelId="{F69B97D8-4E4A-4063-930F-101A74B2AB15}" srcId="{CBF0074A-0FC7-4077-BCF9-CEB59150AFC8}" destId="{F20C8FF4-9862-4DF9-806F-B90D55ADE098}" srcOrd="1" destOrd="0" parTransId="{5452ED12-D44F-4B0C-85CC-760D8ED00141}" sibTransId="{FCDD3D0C-4B3B-47BD-B2D6-3CDDE0A033C2}"/>
+    <dgm:cxn modelId="{F69B97D8-4E4A-4063-930F-101A74B2AB15}" srcId="{CBF0074A-0FC7-4077-BCF9-CEB59150AFC8}" destId="{F20C8FF4-9862-4DF9-806F-B90D55ADE098}" srcOrd="0" destOrd="0" parTransId="{5452ED12-D44F-4B0C-85CC-760D8ED00141}" sibTransId="{FCDD3D0C-4B3B-47BD-B2D6-3CDDE0A033C2}"/>
     <dgm:cxn modelId="{980CADC8-9163-49C6-AD1D-9029C1170EDA}" type="presOf" srcId="{A8E88150-2DB6-46FA-A852-43051AFC02CB}" destId="{CF3C7871-4303-48A3-BB4A-7A86D6B4721D}" srcOrd="0" destOrd="0" presId="urn:microsoft.com/office/officeart/2005/8/layout/orgChart1"/>
     <dgm:cxn modelId="{292496E3-F01C-4600-8952-6DB99B5FFB2A}" type="presOf" srcId="{1C58E7D9-DF76-4E55-ADEE-EF79CE6B1872}" destId="{12C09BAD-4169-4A5B-A324-4C3841F7A0F6}" srcOrd="0" destOrd="0" presId="urn:microsoft.com/office/officeart/2005/8/layout/orgChart1"/>
     <dgm:cxn modelId="{CB552FE5-CAD9-42A3-AEC6-FE53E2A7245A}" type="presOf" srcId="{CCA2B529-B580-4CAA-85C2-8BE46A70C260}" destId="{A8BE3D33-202F-4B78-BACF-C4CB91985458}" srcOrd="0" destOrd="0" presId="urn:microsoft.com/office/officeart/2005/8/layout/orgChart1"/>
     <dgm:cxn modelId="{F2B9ABAA-628B-4BCB-A63B-94B2C67B1CF3}" type="presOf" srcId="{6B14FCA3-6FEA-43EB-9C82-2B07D04536C7}" destId="{13A484D3-7D69-43DA-A929-94F88FBBE4FD}" srcOrd="0" destOrd="0" presId="urn:microsoft.com/office/officeart/2005/8/layout/orgChart1"/>
     <dgm:cxn modelId="{ABC993EF-9ABB-4F70-A356-A543F742C117}" type="presOf" srcId="{6F49CECE-5543-4B62-B83F-169C4977D00E}" destId="{FCB81601-52E9-4994-943C-D44AA55B15FE}" srcOrd="1" destOrd="0" presId="urn:microsoft.com/office/officeart/2005/8/layout/orgChart1"/>
-    <dgm:cxn modelId="{C925D86B-6013-45BD-BD52-D6091DA5F634}" srcId="{CBF0074A-0FC7-4077-BCF9-CEB59150AFC8}" destId="{822D2ADF-B5A2-4854-B448-654CBB195991}" srcOrd="3" destOrd="0" parTransId="{745DD6E8-C64C-4AE8-A101-F8AD12DE56B3}" sibTransId="{A593D349-C685-40B7-8FAE-CFC4A735BEB6}"/>
+    <dgm:cxn modelId="{C925D86B-6013-45BD-BD52-D6091DA5F634}" srcId="{CBF0074A-0FC7-4077-BCF9-CEB59150AFC8}" destId="{822D2ADF-B5A2-4854-B448-654CBB195991}" srcOrd="2" destOrd="0" parTransId="{745DD6E8-C64C-4AE8-A101-F8AD12DE56B3}" sibTransId="{A593D349-C685-40B7-8FAE-CFC4A735BEB6}"/>
     <dgm:cxn modelId="{E3164A34-2478-40CE-AEFD-FFF234E18E72}" type="presOf" srcId="{3FA2808F-BB87-4A68-8BE2-20841C7DF183}" destId="{853316CE-83C9-44FB-9CD1-461AD4922901}" srcOrd="1" destOrd="0" presId="urn:microsoft.com/office/officeart/2005/8/layout/orgChart1"/>
     <dgm:cxn modelId="{92CCBFA7-B549-4CFE-9E0F-C4FA624A8296}" type="presOf" srcId="{5DBC26DE-3F6D-4591-B844-2BDA42210872}" destId="{1A858DA5-A289-4A22-B794-D6D770901C98}" srcOrd="0" destOrd="0" presId="urn:microsoft.com/office/officeart/2005/8/layout/orgChart1"/>
     <dgm:cxn modelId="{13476C7E-F1B1-419F-9880-BDC90D7A11F0}" type="presOf" srcId="{822D2ADF-B5A2-4854-B448-654CBB195991}" destId="{D441324F-5840-4545-95C8-58993D682F03}" srcOrd="0" destOrd="0" presId="urn:microsoft.com/office/officeart/2005/8/layout/orgChart1"/>
     <dgm:cxn modelId="{55A6D12B-3F05-4035-9825-244FEB4355EF}" type="presOf" srcId="{822D2ADF-B5A2-4854-B448-654CBB195991}" destId="{4B05AF45-3B20-4BCF-B0B2-1C0BE009630D}" srcOrd="1" destOrd="0" presId="urn:microsoft.com/office/officeart/2005/8/layout/orgChart1"/>
-    <dgm:cxn modelId="{5D8CD25B-D5CF-4D86-953E-A5848580B418}" type="presOf" srcId="{4EFF8862-D631-4078-B9C3-36D58C0CAF17}" destId="{B2E63F28-B523-474D-ADDF-A821FF109D32}" srcOrd="0" destOrd="0" presId="urn:microsoft.com/office/officeart/2005/8/layout/orgChart1"/>
     <dgm:cxn modelId="{9A737EA9-4E59-4981-940D-98D667F6CFF9}" srcId="{2A4E46BE-C195-430B-A3CE-261648F9B604}" destId="{3D0AB795-C8F5-410B-8C70-7E70771A456A}" srcOrd="1" destOrd="0" parTransId="{918282B8-17D7-4E07-986D-BDC37D84C030}" sibTransId="{8023D927-C469-453C-99C5-88FDBD416086}"/>
     <dgm:cxn modelId="{3E122938-06A5-487B-9569-BAD66CC43255}" type="presOf" srcId="{8B766CED-AF48-4A51-AFEA-B506C25FF9CE}" destId="{AE0F1FAB-E4F7-460E-B74D-9734E7275AB6}" srcOrd="0" destOrd="0" presId="urn:microsoft.com/office/officeart/2005/8/layout/orgChart1"/>
     <dgm:cxn modelId="{C974B6A8-2CF0-4019-AC7B-A98C72140E2A}" type="presOf" srcId="{26A2C07E-9DD6-430B-9316-E4F456AF3D58}" destId="{E29314CE-9117-4D7E-8A9F-C2C3B4D6D154}" srcOrd="0" destOrd="0" presId="urn:microsoft.com/office/officeart/2005/8/layout/orgChart1"/>
     <dgm:cxn modelId="{BE0F8C5F-2B6B-4B9D-A9BD-FF6B7670213E}" type="presOf" srcId="{5FE32230-A646-4579-AA11-A29DF7BEB819}" destId="{6CF77085-0E58-4071-A531-5CE91F8DA348}" srcOrd="0" destOrd="0" presId="urn:microsoft.com/office/officeart/2005/8/layout/orgChart1"/>
     <dgm:cxn modelId="{0FD66CBD-871B-4A98-84B3-C7BA69B1CEB5}" type="presOf" srcId="{3D0AB795-C8F5-410B-8C70-7E70771A456A}" destId="{43564767-2DAF-4E04-9A8E-DD1E3F8D8AE9}" srcOrd="0" destOrd="0" presId="urn:microsoft.com/office/officeart/2005/8/layout/orgChart1"/>
     <dgm:cxn modelId="{DED079FB-DC28-49F4-A964-91ABD9070649}" type="presOf" srcId="{11AD3FAC-CE2C-4BF5-98D5-F96D1E1069F3}" destId="{DA920640-8B72-4913-BA55-9259E051A12B}" srcOrd="0" destOrd="0" presId="urn:microsoft.com/office/officeart/2005/8/layout/orgChart1"/>
-    <dgm:cxn modelId="{69762C4F-5141-48A5-9191-A8D4DDB944CE}" type="presOf" srcId="{8623E6FC-6F85-40A4-AAE8-EFCDEDF47CC5}" destId="{C1A60573-4E66-4FDF-A280-B2DC513766E5}" srcOrd="1" destOrd="0" presId="urn:microsoft.com/office/officeart/2005/8/layout/orgChart1"/>
     <dgm:cxn modelId="{A073F615-FDAE-4758-B829-8824EE34187F}" type="presOf" srcId="{F20C8FF4-9862-4DF9-806F-B90D55ADE098}" destId="{62B8E97A-45F3-49CB-8798-FCFDBA6EB4CE}" srcOrd="1" destOrd="0" presId="urn:microsoft.com/office/officeart/2005/8/layout/orgChart1"/>
     <dgm:cxn modelId="{C372C1FB-5AAB-4B53-953C-A7A9C8355BD8}" type="presOf" srcId="{6B14FCA3-6FEA-43EB-9C82-2B07D04536C7}" destId="{0C07F64B-E45F-43F5-B234-4C17D121787E}" srcOrd="1" destOrd="0" presId="urn:microsoft.com/office/officeart/2005/8/layout/orgChart1"/>
     <dgm:cxn modelId="{57E6A149-1CC4-4803-B1AA-9A3B6E9A5D73}" srcId="{C5A0C7CB-0031-4159-BB53-FA8343CB9558}" destId="{26A2C07E-9DD6-430B-9316-E4F456AF3D58}" srcOrd="1" destOrd="0" parTransId="{5FE32230-A646-4579-AA11-A29DF7BEB819}" sibTransId="{1D8B5989-933B-422D-8C65-7C4FC436C2F4}"/>
     <dgm:cxn modelId="{5AA7E5AA-74F8-4F44-8560-2649C3221A5D}" type="presOf" srcId="{F7CD38E5-D80E-47CE-9C8A-C1EC4A123AAB}" destId="{2094552F-0A68-4D34-89D1-99F4C9D81559}" srcOrd="1" destOrd="0" presId="urn:microsoft.com/office/officeart/2005/8/layout/orgChart1"/>
     <dgm:cxn modelId="{C251BA37-CA07-400E-AC32-A400651E25D5}" srcId="{11AD3FAC-CE2C-4BF5-98D5-F96D1E1069F3}" destId="{6F49CECE-5543-4B62-B83F-169C4977D00E}" srcOrd="0" destOrd="0" parTransId="{D3DE520E-BA57-4D2B-9AB0-F0E8C5EC673A}" sibTransId="{9BA39159-FD0C-44C4-95DF-4106D920A657}"/>
-    <dgm:cxn modelId="{27CF9016-DB8C-44B5-A21D-7AB07E32C74D}" srcId="{F7CD38E5-D80E-47CE-9C8A-C1EC4A123AAB}" destId="{8623E6FC-6F85-40A4-AAE8-EFCDEDF47CC5}" srcOrd="2" destOrd="0" parTransId="{4EFF8862-D631-4078-B9C3-36D58C0CAF17}" sibTransId="{4D61C86C-F5F3-462F-971D-6C5CAB3AA03F}"/>
     <dgm:cxn modelId="{2F1B636B-1811-4463-BDAC-AC19D5AA4C05}" type="presOf" srcId="{F7CD38E5-D80E-47CE-9C8A-C1EC4A123AAB}" destId="{16A858B9-E481-47A4-A994-B887C37078F5}" srcOrd="0" destOrd="0" presId="urn:microsoft.com/office/officeart/2005/8/layout/orgChart1"/>
     <dgm:cxn modelId="{E9B713E3-860A-4A89-8611-6BBBA6AA1FFD}" type="presOf" srcId="{09180BF8-9BB0-4837-87C9-A31B615AF06B}" destId="{AEE27075-2A19-4E8B-B9FC-003EACF0E2C9}" srcOrd="0" destOrd="0" presId="urn:microsoft.com/office/officeart/2005/8/layout/orgChart1"/>
     <dgm:cxn modelId="{0CDBC4DD-A290-4592-BE36-285508EF8DBF}" type="presOf" srcId="{E3EA836E-DABB-4A96-B743-CFF4C64EB46F}" destId="{5D5F107F-E70D-4FA0-826E-585751096CDC}" srcOrd="0" destOrd="0" presId="urn:microsoft.com/office/officeart/2005/8/layout/orgChart1"/>
     <dgm:cxn modelId="{FF9F216D-386F-479D-8E9D-6F17128B4DEB}" type="presOf" srcId="{A57537C8-D3B4-4574-A41F-A2E2552D7B2A}" destId="{52565F71-66FC-45DF-AB63-8158775C40A3}" srcOrd="0" destOrd="0" presId="urn:microsoft.com/office/officeart/2005/8/layout/orgChart1"/>
     <dgm:cxn modelId="{1FECF204-D318-462B-B01B-158E23A2574D}" type="presOf" srcId="{76085044-8EBB-4871-88EA-33CBECC08835}" destId="{15A61DF0-AC49-4E69-9546-90778A86DEB3}" srcOrd="0" destOrd="0" presId="urn:microsoft.com/office/officeart/2005/8/layout/orgChart1"/>
-    <dgm:cxn modelId="{428FB282-4052-4B54-A859-EEA72BF15C8F}" type="presOf" srcId="{01B93828-B211-4FCF-92FE-46C1C9C80484}" destId="{F2A0CB5F-BBE7-4880-9B72-74572386B4E4}" srcOrd="0" destOrd="0" presId="urn:microsoft.com/office/officeart/2005/8/layout/orgChart1"/>
     <dgm:cxn modelId="{524FC1AB-3F14-447D-BE6B-AF8F7F53821C}" type="presOf" srcId="{5452ED12-D44F-4B0C-85CC-760D8ED00141}" destId="{4FC84424-77B3-4BAD-A376-197D931F1926}" srcOrd="0" destOrd="0" presId="urn:microsoft.com/office/officeart/2005/8/layout/orgChart1"/>
-    <dgm:cxn modelId="{01B11A7F-DE74-40B5-96A2-73C2774F2571}" type="presOf" srcId="{7F46ACF6-CFF7-483E-8437-D6501DD735C9}" destId="{FD456E50-5289-4FBB-BB08-49EC87D76EBD}" srcOrd="1" destOrd="0" presId="urn:microsoft.com/office/officeart/2005/8/layout/orgChart1"/>
     <dgm:cxn modelId="{0A423659-E204-4C22-AD42-0AA1EA80AE9B}" type="presOf" srcId="{3D0AB795-C8F5-410B-8C70-7E70771A456A}" destId="{EEE5D1A4-30A3-479F-8F91-9D27C0765055}" srcOrd="1" destOrd="0" presId="urn:microsoft.com/office/officeart/2005/8/layout/orgChart1"/>
     <dgm:cxn modelId="{858AEB35-5A6C-40CC-A054-70347A78CE01}" type="presOf" srcId="{3045F83C-2937-4C11-A432-105F2D7F79C8}" destId="{CFF27639-2EAA-4E02-8133-52CB55E04712}" srcOrd="1" destOrd="0" presId="urn:microsoft.com/office/officeart/2005/8/layout/orgChart1"/>
     <dgm:cxn modelId="{73E66143-C829-4E06-94B8-8829ADE92A26}" type="presOf" srcId="{3A48E1CA-AC4A-45C6-81B0-46F7E75476EE}" destId="{581E77F2-6530-4657-B911-9D5FCFEFE76E}" srcOrd="1" destOrd="0" presId="urn:microsoft.com/office/officeart/2005/8/layout/orgChart1"/>
     <dgm:cxn modelId="{BCC25F63-BA85-4368-98FB-8020D6B004F7}" srcId="{2A4E46BE-C195-430B-A3CE-261648F9B604}" destId="{A57537C8-D3B4-4574-A41F-A2E2552D7B2A}" srcOrd="3" destOrd="0" parTransId="{63B6199B-540A-42F9-8A18-8DFF59807143}" sibTransId="{6E1B521E-AF56-4B0B-A727-58D07F147BA5}"/>
-    <dgm:cxn modelId="{53CFCADF-3CAB-4F4D-ADD8-D41D59F19AF8}" type="presOf" srcId="{7F46ACF6-CFF7-483E-8437-D6501DD735C9}" destId="{FF3BFF33-8FD3-4579-94E9-E5FEBB720C18}" srcOrd="0" destOrd="0" presId="urn:microsoft.com/office/officeart/2005/8/layout/orgChart1"/>
     <dgm:cxn modelId="{52297624-0AAF-4F2D-A253-ABD46031C9A6}" srcId="{6F49CECE-5543-4B62-B83F-169C4977D00E}" destId="{CBF0074A-0FC7-4077-BCF9-CEB59150AFC8}" srcOrd="2" destOrd="0" parTransId="{0F43290D-0DEA-41F8-906D-B28EE356A089}" sibTransId="{9BCB906E-1533-4B08-9A8D-23B6032E30B6}"/>
     <dgm:cxn modelId="{DA4333CF-35D0-4567-861D-26A3E76A0E16}" type="presOf" srcId="{26A2C07E-9DD6-430B-9316-E4F456AF3D58}" destId="{C3400AA3-CE18-4619-AAFF-ABBA4687A208}" srcOrd="1" destOrd="0" presId="urn:microsoft.com/office/officeart/2005/8/layout/orgChart1"/>
     <dgm:cxn modelId="{1359D5D9-25D5-4A11-BA71-FD60F80BBE91}" type="presOf" srcId="{2A4E46BE-C195-430B-A3CE-261648F9B604}" destId="{56FC41C9-994A-4EF6-91C4-1F041955A636}" srcOrd="1" destOrd="0" presId="urn:microsoft.com/office/officeart/2005/8/layout/orgChart1"/>
     <dgm:cxn modelId="{2C8CBF3B-9342-4D81-BC1E-2FCDC62EEC6D}" srcId="{C5A0C7CB-0031-4159-BB53-FA8343CB9558}" destId="{3A48E1CA-AC4A-45C6-81B0-46F7E75476EE}" srcOrd="0" destOrd="0" parTransId="{1C58E7D9-DF76-4E55-ADEE-EF79CE6B1872}" sibTransId="{2F091561-7854-4F36-8B58-45089F2FEF25}"/>
     <dgm:cxn modelId="{A7E6D198-F333-4D0A-BC25-27F80AF81CC2}" type="presOf" srcId="{8791AAB4-64F1-46F3-99B1-B8F31CAACE40}" destId="{D89C1994-7969-4A61-8D72-015E632E69B6}" srcOrd="0" destOrd="0" presId="urn:microsoft.com/office/officeart/2005/8/layout/orgChart1"/>
-    <dgm:cxn modelId="{97F23B9C-E7FF-4DEF-906B-B3EA7BA48685}" srcId="{CBF0074A-0FC7-4077-BCF9-CEB59150AFC8}" destId="{3FA2808F-BB87-4A68-8BE2-20841C7DF183}" srcOrd="2" destOrd="0" parTransId="{76085044-8EBB-4871-88EA-33CBECC08835}" sibTransId="{B16DB9A8-ABE8-4E12-90EB-661CE96FC166}"/>
+    <dgm:cxn modelId="{97F23B9C-E7FF-4DEF-906B-B3EA7BA48685}" srcId="{CBF0074A-0FC7-4077-BCF9-CEB59150AFC8}" destId="{3FA2808F-BB87-4A68-8BE2-20841C7DF183}" srcOrd="1" destOrd="0" parTransId="{76085044-8EBB-4871-88EA-33CBECC08835}" sibTransId="{B16DB9A8-ABE8-4E12-90EB-661CE96FC166}"/>
     <dgm:cxn modelId="{DD21849E-B534-46F5-BB52-12379AEDD5DF}" type="presOf" srcId="{05C0BBE8-0665-4D30-A416-9C56A063806A}" destId="{3ADED271-00FF-4B63-A289-DD03469DE526}" srcOrd="0" destOrd="0" presId="urn:microsoft.com/office/officeart/2005/8/layout/orgChart1"/>
     <dgm:cxn modelId="{E34FCD88-2796-424C-8120-6BA61620DA9D}" type="presOf" srcId="{5DBC26DE-3F6D-4591-B844-2BDA42210872}" destId="{AEA55E03-C54A-4EA4-9BDB-2776081E2FA7}" srcOrd="1" destOrd="0" presId="urn:microsoft.com/office/officeart/2005/8/layout/orgChart1"/>
     <dgm:cxn modelId="{9EB8E855-04EF-4ECF-904F-8624A148C0C9}" type="presOf" srcId="{918282B8-17D7-4E07-986D-BDC37D84C030}" destId="{3DEBF5CE-5AAD-47A7-BA08-04DF2AC62CDD}" srcOrd="0" destOrd="0" presId="urn:microsoft.com/office/officeart/2005/8/layout/orgChart1"/>
@@ -2756,7 +2572,6 @@
     <dgm:cxn modelId="{28D6E7BF-4CED-4C3F-8180-ECB7B3E9457C}" srcId="{6F49CECE-5543-4B62-B83F-169C4977D00E}" destId="{C5A0C7CB-0031-4159-BB53-FA8343CB9558}" srcOrd="0" destOrd="0" parTransId="{CCA2B529-B580-4CAA-85C2-8BE46A70C260}" sibTransId="{72277EE4-4B08-40B8-82D4-82C90447F9FF}"/>
     <dgm:cxn modelId="{9A46CFD3-D637-4D0A-9EB5-DB72F43946C5}" type="presOf" srcId="{B8853233-BCEB-4C33-B359-D179A1F03C11}" destId="{DA555904-4FC1-46A1-8E83-ED69E59E57D1}" srcOrd="0" destOrd="0" presId="urn:microsoft.com/office/officeart/2005/8/layout/orgChart1"/>
     <dgm:cxn modelId="{B673BA81-67C8-44BE-BCF4-0889A47A9CE9}" type="presOf" srcId="{C5A0C7CB-0031-4159-BB53-FA8343CB9558}" destId="{5C7F4BF0-E6A3-4F37-B2A7-B5EA6F899DB3}" srcOrd="1" destOrd="0" presId="urn:microsoft.com/office/officeart/2005/8/layout/orgChart1"/>
-    <dgm:cxn modelId="{4A0AC1D1-77A4-4D82-99E3-CBBB22155CA0}" srcId="{CBF0074A-0FC7-4077-BCF9-CEB59150AFC8}" destId="{7F46ACF6-CFF7-483E-8437-D6501DD735C9}" srcOrd="0" destOrd="0" parTransId="{01B93828-B211-4FCF-92FE-46C1C9C80484}" sibTransId="{EC5CA40D-E826-4ED4-98C0-9C1F6690156E}"/>
     <dgm:cxn modelId="{7BD70AEC-7B22-4583-905E-94335C5C2C1F}" type="presOf" srcId="{F20C8FF4-9862-4DF9-806F-B90D55ADE098}" destId="{A2C33C9F-E20E-4D1E-BBFD-28AA5D38E75F}" srcOrd="0" destOrd="0" presId="urn:microsoft.com/office/officeart/2005/8/layout/orgChart1"/>
     <dgm:cxn modelId="{69D7E34D-881E-4F95-AF8A-239B3E87145B}" type="presOf" srcId="{0F43290D-0DEA-41F8-906D-B28EE356A089}" destId="{06C39927-640E-4F06-9A9C-9EDA030074EE}" srcOrd="0" destOrd="0" presId="urn:microsoft.com/office/officeart/2005/8/layout/orgChart1"/>
     <dgm:cxn modelId="{F8558E22-48F0-47B3-B9F4-12CD37C48256}" srcId="{6F49CECE-5543-4B62-B83F-169C4977D00E}" destId="{2A4E46BE-C195-430B-A3CE-261648F9B604}" srcOrd="1" destOrd="0" parTransId="{05C0BBE8-0665-4D30-A416-9C56A063806A}" sibTransId="{5C6612EC-DF1F-482D-906C-70DECA90A4D7}"/>
@@ -2764,7 +2579,6 @@
     <dgm:cxn modelId="{DCF65B2D-9E7E-4283-BE9E-C337ACF78AF7}" srcId="{2A4E46BE-C195-430B-A3CE-261648F9B604}" destId="{8B766CED-AF48-4A51-AFEA-B506C25FF9CE}" srcOrd="2" destOrd="0" parTransId="{09180BF8-9BB0-4837-87C9-A31B615AF06B}" sibTransId="{0F911C62-476D-4F11-8D1E-2347F40CFAB8}"/>
     <dgm:cxn modelId="{0AF776DB-61EA-438F-8C09-F78A5E18621A}" type="presOf" srcId="{745DD6E8-C64C-4AE8-A101-F8AD12DE56B3}" destId="{FA1C85F5-EB77-4684-8A8B-A31BFC407067}" srcOrd="0" destOrd="0" presId="urn:microsoft.com/office/officeart/2005/8/layout/orgChart1"/>
     <dgm:cxn modelId="{AF195CEA-3015-4DFD-84AC-BC30B43A9847}" type="presOf" srcId="{3045F83C-2937-4C11-A432-105F2D7F79C8}" destId="{A541300C-4EA0-4F2F-A86D-61A27E02B787}" srcOrd="0" destOrd="0" presId="urn:microsoft.com/office/officeart/2005/8/layout/orgChart1"/>
-    <dgm:cxn modelId="{2ECA5E35-BBD7-4126-93CF-F6D86EA39AC8}" type="presOf" srcId="{8623E6FC-6F85-40A4-AAE8-EFCDEDF47CC5}" destId="{7ED97DFD-2695-4177-9E52-49490FD3D0C7}" srcOrd="0" destOrd="0" presId="urn:microsoft.com/office/officeart/2005/8/layout/orgChart1"/>
     <dgm:cxn modelId="{9C5F334D-6D84-43DC-A89C-3CE978584E70}" type="presOf" srcId="{A02E4216-9295-4A98-B25D-724EEEACEB86}" destId="{71C01193-494F-4E8F-8F6B-2A092BF6A52A}" srcOrd="0" destOrd="0" presId="urn:microsoft.com/office/officeart/2005/8/layout/orgChart1"/>
     <dgm:cxn modelId="{073A4957-F418-4978-B3CE-3D5584983791}" type="presOf" srcId="{3FA2808F-BB87-4A68-8BE2-20841C7DF183}" destId="{BEB8562A-B0BC-4237-ADB8-FF4D03EEE094}" srcOrd="0" destOrd="0" presId="urn:microsoft.com/office/officeart/2005/8/layout/orgChart1"/>
     <dgm:cxn modelId="{B6DA744F-CD68-493E-A466-EA8F78B142F5}" srcId="{6F49CECE-5543-4B62-B83F-169C4977D00E}" destId="{F7CD38E5-D80E-47CE-9C8A-C1EC4A123AAB}" srcOrd="3" destOrd="0" parTransId="{B8853233-BCEB-4C33-B359-D179A1F03C11}" sibTransId="{88A6F3EA-455A-410C-97F5-7906583BECEE}"/>
@@ -2843,29 +2657,22 @@
     <dgm:cxn modelId="{26D8721C-F239-49DC-ADBE-61F0CC6C60E0}" type="presParOf" srcId="{B6C9187E-5427-4D3A-9D26-51738810365F}" destId="{D3292D10-A68A-4ED9-A3C7-E3AF8D05334B}" srcOrd="0" destOrd="0" presId="urn:microsoft.com/office/officeart/2005/8/layout/orgChart1"/>
     <dgm:cxn modelId="{94BEF215-97C3-4E40-BB5E-6C758BF18EB6}" type="presParOf" srcId="{B6C9187E-5427-4D3A-9D26-51738810365F}" destId="{21889749-E84D-45E7-B2D5-FFE07A040AC9}" srcOrd="1" destOrd="0" presId="urn:microsoft.com/office/officeart/2005/8/layout/orgChart1"/>
     <dgm:cxn modelId="{1439B06D-2738-46A8-A6CA-D54545E903C3}" type="presParOf" srcId="{8A44FE49-ACCB-4799-BA7F-095F28D4DD3C}" destId="{62E8F37F-05D6-4A12-86EE-82F86FD13AEE}" srcOrd="1" destOrd="0" presId="urn:microsoft.com/office/officeart/2005/8/layout/orgChart1"/>
-    <dgm:cxn modelId="{D430F9B4-04F6-4E97-8B06-E0D963CA73B2}" type="presParOf" srcId="{62E8F37F-05D6-4A12-86EE-82F86FD13AEE}" destId="{F2A0CB5F-BBE7-4880-9B72-74572386B4E4}" srcOrd="0" destOrd="0" presId="urn:microsoft.com/office/officeart/2005/8/layout/orgChart1"/>
-    <dgm:cxn modelId="{7862CC37-812C-472C-8DDD-D248F842F9F1}" type="presParOf" srcId="{62E8F37F-05D6-4A12-86EE-82F86FD13AEE}" destId="{E5BE672B-1C01-44E8-9372-9E496F99BF39}" srcOrd="1" destOrd="0" presId="urn:microsoft.com/office/officeart/2005/8/layout/orgChart1"/>
-    <dgm:cxn modelId="{34A84838-A908-4CED-8792-7A93CEB99AA2}" type="presParOf" srcId="{E5BE672B-1C01-44E8-9372-9E496F99BF39}" destId="{EC2DD0CB-133C-4BB4-B3D1-1A473B8B3161}" srcOrd="0" destOrd="0" presId="urn:microsoft.com/office/officeart/2005/8/layout/orgChart1"/>
-    <dgm:cxn modelId="{9B0D0909-7A58-4BA7-8A8D-2D0E33ED8A7C}" type="presParOf" srcId="{EC2DD0CB-133C-4BB4-B3D1-1A473B8B3161}" destId="{FF3BFF33-8FD3-4579-94E9-E5FEBB720C18}" srcOrd="0" destOrd="0" presId="urn:microsoft.com/office/officeart/2005/8/layout/orgChart1"/>
-    <dgm:cxn modelId="{87630910-68F5-4BD5-A54F-E7C1785139A8}" type="presParOf" srcId="{EC2DD0CB-133C-4BB4-B3D1-1A473B8B3161}" destId="{FD456E50-5289-4FBB-BB08-49EC87D76EBD}" srcOrd="1" destOrd="0" presId="urn:microsoft.com/office/officeart/2005/8/layout/orgChart1"/>
-    <dgm:cxn modelId="{53EABA16-3A49-4D09-BD1B-A866B6A59BBB}" type="presParOf" srcId="{E5BE672B-1C01-44E8-9372-9E496F99BF39}" destId="{7ACC8D40-57CC-4818-8F00-A0014A9C7EA5}" srcOrd="1" destOrd="0" presId="urn:microsoft.com/office/officeart/2005/8/layout/orgChart1"/>
-    <dgm:cxn modelId="{B0464BB2-CB28-49DA-A757-D640DFA760D6}" type="presParOf" srcId="{E5BE672B-1C01-44E8-9372-9E496F99BF39}" destId="{0845DDA4-9063-4746-93ED-D1D1B1C81886}" srcOrd="2" destOrd="0" presId="urn:microsoft.com/office/officeart/2005/8/layout/orgChart1"/>
-    <dgm:cxn modelId="{44DF4AFA-EE88-48D5-A578-E0F330C7513F}" type="presParOf" srcId="{62E8F37F-05D6-4A12-86EE-82F86FD13AEE}" destId="{4FC84424-77B3-4BAD-A376-197D931F1926}" srcOrd="2" destOrd="0" presId="urn:microsoft.com/office/officeart/2005/8/layout/orgChart1"/>
-    <dgm:cxn modelId="{27CA4369-B229-4E31-91CD-37EFD63414F8}" type="presParOf" srcId="{62E8F37F-05D6-4A12-86EE-82F86FD13AEE}" destId="{6888FF10-8BFE-4480-AFEA-EBBDDE3C7658}" srcOrd="3" destOrd="0" presId="urn:microsoft.com/office/officeart/2005/8/layout/orgChart1"/>
+    <dgm:cxn modelId="{44DF4AFA-EE88-48D5-A578-E0F330C7513F}" type="presParOf" srcId="{62E8F37F-05D6-4A12-86EE-82F86FD13AEE}" destId="{4FC84424-77B3-4BAD-A376-197D931F1926}" srcOrd="0" destOrd="0" presId="urn:microsoft.com/office/officeart/2005/8/layout/orgChart1"/>
+    <dgm:cxn modelId="{27CA4369-B229-4E31-91CD-37EFD63414F8}" type="presParOf" srcId="{62E8F37F-05D6-4A12-86EE-82F86FD13AEE}" destId="{6888FF10-8BFE-4480-AFEA-EBBDDE3C7658}" srcOrd="1" destOrd="0" presId="urn:microsoft.com/office/officeart/2005/8/layout/orgChart1"/>
     <dgm:cxn modelId="{A4510A81-F13E-4148-98DF-EA9C9B80EAEF}" type="presParOf" srcId="{6888FF10-8BFE-4480-AFEA-EBBDDE3C7658}" destId="{8C02771C-0BC4-4A48-9CFD-C48A6942D511}" srcOrd="0" destOrd="0" presId="urn:microsoft.com/office/officeart/2005/8/layout/orgChart1"/>
     <dgm:cxn modelId="{0D4E9332-5D93-4102-9678-29B90805DEB8}" type="presParOf" srcId="{8C02771C-0BC4-4A48-9CFD-C48A6942D511}" destId="{A2C33C9F-E20E-4D1E-BBFD-28AA5D38E75F}" srcOrd="0" destOrd="0" presId="urn:microsoft.com/office/officeart/2005/8/layout/orgChart1"/>
     <dgm:cxn modelId="{6B47070B-2A73-49E3-979A-45F96DBDE0D3}" type="presParOf" srcId="{8C02771C-0BC4-4A48-9CFD-C48A6942D511}" destId="{62B8E97A-45F3-49CB-8798-FCFDBA6EB4CE}" srcOrd="1" destOrd="0" presId="urn:microsoft.com/office/officeart/2005/8/layout/orgChart1"/>
     <dgm:cxn modelId="{64C9D153-F99E-49E5-9D4F-F5D63FF178F9}" type="presParOf" srcId="{6888FF10-8BFE-4480-AFEA-EBBDDE3C7658}" destId="{D50725E9-9A3A-4A06-8E90-C3B34AEEB6B8}" srcOrd="1" destOrd="0" presId="urn:microsoft.com/office/officeart/2005/8/layout/orgChart1"/>
     <dgm:cxn modelId="{324DB109-76E1-444E-A2E0-8F696568D252}" type="presParOf" srcId="{6888FF10-8BFE-4480-AFEA-EBBDDE3C7658}" destId="{E81D918F-EBD6-4509-B7C2-D0AD7E0D832A}" srcOrd="2" destOrd="0" presId="urn:microsoft.com/office/officeart/2005/8/layout/orgChart1"/>
-    <dgm:cxn modelId="{1F6A5BEC-DA82-43B9-B4D5-639916DE082D}" type="presParOf" srcId="{62E8F37F-05D6-4A12-86EE-82F86FD13AEE}" destId="{15A61DF0-AC49-4E69-9546-90778A86DEB3}" srcOrd="4" destOrd="0" presId="urn:microsoft.com/office/officeart/2005/8/layout/orgChart1"/>
-    <dgm:cxn modelId="{5DCFEED7-2131-43CD-AD05-48A5638D9173}" type="presParOf" srcId="{62E8F37F-05D6-4A12-86EE-82F86FD13AEE}" destId="{442BFDE0-2E14-4E63-AB60-120E9C7FF3DF}" srcOrd="5" destOrd="0" presId="urn:microsoft.com/office/officeart/2005/8/layout/orgChart1"/>
+    <dgm:cxn modelId="{1F6A5BEC-DA82-43B9-B4D5-639916DE082D}" type="presParOf" srcId="{62E8F37F-05D6-4A12-86EE-82F86FD13AEE}" destId="{15A61DF0-AC49-4E69-9546-90778A86DEB3}" srcOrd="2" destOrd="0" presId="urn:microsoft.com/office/officeart/2005/8/layout/orgChart1"/>
+    <dgm:cxn modelId="{5DCFEED7-2131-43CD-AD05-48A5638D9173}" type="presParOf" srcId="{62E8F37F-05D6-4A12-86EE-82F86FD13AEE}" destId="{442BFDE0-2E14-4E63-AB60-120E9C7FF3DF}" srcOrd="3" destOrd="0" presId="urn:microsoft.com/office/officeart/2005/8/layout/orgChart1"/>
     <dgm:cxn modelId="{F2CD6174-7374-4E3F-8FE3-5D9ECA77E471}" type="presParOf" srcId="{442BFDE0-2E14-4E63-AB60-120E9C7FF3DF}" destId="{798211C7-BF75-46BF-B6B6-80ED60181BF1}" srcOrd="0" destOrd="0" presId="urn:microsoft.com/office/officeart/2005/8/layout/orgChart1"/>
     <dgm:cxn modelId="{049342BC-C7F1-40A6-8AFF-B86C85F62899}" type="presParOf" srcId="{798211C7-BF75-46BF-B6B6-80ED60181BF1}" destId="{BEB8562A-B0BC-4237-ADB8-FF4D03EEE094}" srcOrd="0" destOrd="0" presId="urn:microsoft.com/office/officeart/2005/8/layout/orgChart1"/>
     <dgm:cxn modelId="{DC9342BD-8547-4423-975A-23C78B6658D0}" type="presParOf" srcId="{798211C7-BF75-46BF-B6B6-80ED60181BF1}" destId="{853316CE-83C9-44FB-9CD1-461AD4922901}" srcOrd="1" destOrd="0" presId="urn:microsoft.com/office/officeart/2005/8/layout/orgChart1"/>
     <dgm:cxn modelId="{D4CC8EA9-1FA9-4767-8694-D9C4E64D6E11}" type="presParOf" srcId="{442BFDE0-2E14-4E63-AB60-120E9C7FF3DF}" destId="{E18BF7FA-F3AD-4C93-BF71-33F5B4E98C17}" srcOrd="1" destOrd="0" presId="urn:microsoft.com/office/officeart/2005/8/layout/orgChart1"/>
     <dgm:cxn modelId="{F79BB050-D6EA-4F9E-9FB5-4C07FCF5BE8B}" type="presParOf" srcId="{442BFDE0-2E14-4E63-AB60-120E9C7FF3DF}" destId="{214F8899-1BCD-47E5-A07A-44C98BA8AB96}" srcOrd="2" destOrd="0" presId="urn:microsoft.com/office/officeart/2005/8/layout/orgChart1"/>
-    <dgm:cxn modelId="{CEBD56F2-84FF-4A4B-B5A4-93B38B7967C1}" type="presParOf" srcId="{62E8F37F-05D6-4A12-86EE-82F86FD13AEE}" destId="{FA1C85F5-EB77-4684-8A8B-A31BFC407067}" srcOrd="6" destOrd="0" presId="urn:microsoft.com/office/officeart/2005/8/layout/orgChart1"/>
-    <dgm:cxn modelId="{2854A8B0-1C02-4015-B26D-50A95CAD9FBD}" type="presParOf" srcId="{62E8F37F-05D6-4A12-86EE-82F86FD13AEE}" destId="{627DF487-CE70-4706-A281-8DE22DE7F37A}" srcOrd="7" destOrd="0" presId="urn:microsoft.com/office/officeart/2005/8/layout/orgChart1"/>
+    <dgm:cxn modelId="{CEBD56F2-84FF-4A4B-B5A4-93B38B7967C1}" type="presParOf" srcId="{62E8F37F-05D6-4A12-86EE-82F86FD13AEE}" destId="{FA1C85F5-EB77-4684-8A8B-A31BFC407067}" srcOrd="4" destOrd="0" presId="urn:microsoft.com/office/officeart/2005/8/layout/orgChart1"/>
+    <dgm:cxn modelId="{2854A8B0-1C02-4015-B26D-50A95CAD9FBD}" type="presParOf" srcId="{62E8F37F-05D6-4A12-86EE-82F86FD13AEE}" destId="{627DF487-CE70-4706-A281-8DE22DE7F37A}" srcOrd="5" destOrd="0" presId="urn:microsoft.com/office/officeart/2005/8/layout/orgChart1"/>
     <dgm:cxn modelId="{056AADDA-171D-4CA9-BE01-E3F10D68EE87}" type="presParOf" srcId="{627DF487-CE70-4706-A281-8DE22DE7F37A}" destId="{952A88E3-1A81-432B-84B5-0BC968351FAA}" srcOrd="0" destOrd="0" presId="urn:microsoft.com/office/officeart/2005/8/layout/orgChart1"/>
     <dgm:cxn modelId="{562C0622-1BB7-4618-B874-EEC48246DDD7}" type="presParOf" srcId="{952A88E3-1A81-432B-84B5-0BC968351FAA}" destId="{D441324F-5840-4545-95C8-58993D682F03}" srcOrd="0" destOrd="0" presId="urn:microsoft.com/office/officeart/2005/8/layout/orgChart1"/>
     <dgm:cxn modelId="{AD122A56-650D-4654-908A-7F9CA2E1A000}" type="presParOf" srcId="{952A88E3-1A81-432B-84B5-0BC968351FAA}" destId="{4B05AF45-3B20-4BCF-B0B2-1C0BE009630D}" srcOrd="1" destOrd="0" presId="urn:microsoft.com/office/officeart/2005/8/layout/orgChart1"/>
@@ -2892,13 +2699,6 @@
     <dgm:cxn modelId="{7C4898A7-8994-4FBA-B6FB-B4BC8D4B8382}" type="presParOf" srcId="{F17457A2-8BA6-436A-B365-AD336AC1D72A}" destId="{CFF27639-2EAA-4E02-8133-52CB55E04712}" srcOrd="1" destOrd="0" presId="urn:microsoft.com/office/officeart/2005/8/layout/orgChart1"/>
     <dgm:cxn modelId="{11A653E9-3C8C-4C55-A02D-B184CE7C2137}" type="presParOf" srcId="{5329E8EA-F74C-4CAB-A6AA-1B898308B3A8}" destId="{15ACB54C-2748-46F9-95CF-E655985BFACB}" srcOrd="1" destOrd="0" presId="urn:microsoft.com/office/officeart/2005/8/layout/orgChart1"/>
     <dgm:cxn modelId="{8A183B00-0737-452E-8D1D-92F029F2BECB}" type="presParOf" srcId="{5329E8EA-F74C-4CAB-A6AA-1B898308B3A8}" destId="{7EDBF25C-4307-428E-8778-7B10CE86AE58}" srcOrd="2" destOrd="0" presId="urn:microsoft.com/office/officeart/2005/8/layout/orgChart1"/>
-    <dgm:cxn modelId="{C7BD5895-1F86-4418-AB72-A1E62EA81127}" type="presParOf" srcId="{2EE3ECC5-032E-4EC3-BDEC-BC203B324050}" destId="{B2E63F28-B523-474D-ADDF-A821FF109D32}" srcOrd="4" destOrd="0" presId="urn:microsoft.com/office/officeart/2005/8/layout/orgChart1"/>
-    <dgm:cxn modelId="{4EE2BB5E-5D6F-4B48-A238-C827EA2CF669}" type="presParOf" srcId="{2EE3ECC5-032E-4EC3-BDEC-BC203B324050}" destId="{D2C744F3-EB1E-4086-A394-3B3EDCDF9CD9}" srcOrd="5" destOrd="0" presId="urn:microsoft.com/office/officeart/2005/8/layout/orgChart1"/>
-    <dgm:cxn modelId="{837E7B55-DAFF-4FF0-B092-A0A9DAB9B74C}" type="presParOf" srcId="{D2C744F3-EB1E-4086-A394-3B3EDCDF9CD9}" destId="{485AC56D-E0CA-44C9-9D69-E8C128CCF951}" srcOrd="0" destOrd="0" presId="urn:microsoft.com/office/officeart/2005/8/layout/orgChart1"/>
-    <dgm:cxn modelId="{6DED3750-5C23-4C5F-80BA-C7EDB37F39AF}" type="presParOf" srcId="{485AC56D-E0CA-44C9-9D69-E8C128CCF951}" destId="{7ED97DFD-2695-4177-9E52-49490FD3D0C7}" srcOrd="0" destOrd="0" presId="urn:microsoft.com/office/officeart/2005/8/layout/orgChart1"/>
-    <dgm:cxn modelId="{9F6586D4-7A8C-4CCC-B719-17FE6D979887}" type="presParOf" srcId="{485AC56D-E0CA-44C9-9D69-E8C128CCF951}" destId="{C1A60573-4E66-4FDF-A280-B2DC513766E5}" srcOrd="1" destOrd="0" presId="urn:microsoft.com/office/officeart/2005/8/layout/orgChart1"/>
-    <dgm:cxn modelId="{266E8E50-D00F-4101-8708-CF0D262BB4BB}" type="presParOf" srcId="{D2C744F3-EB1E-4086-A394-3B3EDCDF9CD9}" destId="{0F053D99-DF21-42A0-9C10-E845D7419C35}" srcOrd="1" destOrd="0" presId="urn:microsoft.com/office/officeart/2005/8/layout/orgChart1"/>
-    <dgm:cxn modelId="{5CAC91A2-8178-4B8A-BA63-F8C8C220FAF1}" type="presParOf" srcId="{D2C744F3-EB1E-4086-A394-3B3EDCDF9CD9}" destId="{A9A38BEE-B6E3-4814-BF59-2B5E93418BE9}" srcOrd="2" destOrd="0" presId="urn:microsoft.com/office/officeart/2005/8/layout/orgChart1"/>
     <dgm:cxn modelId="{D45FE72D-F6E1-4FDC-BA30-8EB902242254}" type="presParOf" srcId="{C11BF068-DD04-4674-9A7F-17CD1BA4133C}" destId="{278C60CD-FD00-4CA7-9D49-CB1F6E333D23}" srcOrd="2" destOrd="0" presId="urn:microsoft.com/office/officeart/2005/8/layout/orgChart1"/>
     <dgm:cxn modelId="{95C87760-73B5-4742-ADF5-4F03710D713D}" type="presParOf" srcId="{6ADC3425-90B0-4EC6-B7C7-444EF76F3F21}" destId="{112D33FD-4EF8-4F76-99AE-43AA9337356C}" srcOrd="2" destOrd="0" presId="urn:microsoft.com/office/officeart/2005/8/layout/orgChart1"/>
     <dgm:cxn modelId="{CAC6D940-31F2-443A-B4AF-06B9312BFD91}" type="presParOf" srcId="{45FC5C96-3820-4EDB-A39B-DA49F664CAB4}" destId="{F34F51E5-9A98-4CF1-A078-8BA3D575C345}" srcOrd="2" destOrd="0" presId="urn:microsoft.com/office/officeart/2005/8/layout/orgChart1"/>
@@ -2921,64 +2721,6 @@
       <dsp:cNvGrpSpPr/>
     </dsp:nvGrpSpPr>
     <dsp:grpSpPr/>
-    <dsp:sp modelId="{B2E63F28-B523-474D-ADDF-A821FF109D32}">
-      <dsp:nvSpPr>
-        <dsp:cNvPr id="0" name=""/>
-        <dsp:cNvSpPr/>
-      </dsp:nvSpPr>
-      <dsp:spPr>
-        <a:xfrm>
-          <a:off x="6429486" y="2766640"/>
-          <a:ext cx="215986" cy="2707034"/>
-        </a:xfrm>
-        <a:custGeom>
-          <a:avLst/>
-          <a:gdLst/>
-          <a:ahLst/>
-          <a:cxnLst/>
-          <a:rect l="0" t="0" r="0" b="0"/>
-          <a:pathLst>
-            <a:path>
-              <a:moveTo>
-                <a:pt x="0" y="0"/>
-              </a:moveTo>
-              <a:lnTo>
-                <a:pt x="0" y="2707034"/>
-              </a:lnTo>
-              <a:lnTo>
-                <a:pt x="215986" y="2707034"/>
-              </a:lnTo>
-            </a:path>
-          </a:pathLst>
-        </a:custGeom>
-        <a:noFill/>
-        <a:ln w="12700" cap="flat" cmpd="sng" algn="ctr">
-          <a:solidFill>
-            <a:schemeClr val="accent6">
-              <a:hueOff val="0"/>
-              <a:satOff val="0"/>
-              <a:lumOff val="0"/>
-              <a:alphaOff val="0"/>
-            </a:schemeClr>
-          </a:solidFill>
-          <a:prstDash val="solid"/>
-          <a:miter lim="800000"/>
-        </a:ln>
-        <a:effectLst/>
-      </dsp:spPr>
-      <dsp:style>
-        <a:lnRef idx="2">
-          <a:scrgbClr r="0" g="0" b="0"/>
-        </a:lnRef>
-        <a:fillRef idx="0">
-          <a:scrgbClr r="0" g="0" b="0"/>
-        </a:fillRef>
-        <a:effectRef idx="0">
-          <a:scrgbClr r="0" g="0" b="0"/>
-        </a:effectRef>
-        <a:fontRef idx="minor"/>
-      </dsp:style>
-    </dsp:sp>
     <dsp:sp modelId="{5D5F107F-E70D-4FA0-826E-585751096CDC}">
       <dsp:nvSpPr>
         <dsp:cNvPr id="0" name=""/>
@@ -3164,64 +2906,6 @@
       <dsp:spPr>
         <a:xfrm>
           <a:off x="4687192" y="2766640"/>
-          <a:ext cx="215986" cy="3729372"/>
-        </a:xfrm>
-        <a:custGeom>
-          <a:avLst/>
-          <a:gdLst/>
-          <a:ahLst/>
-          <a:cxnLst/>
-          <a:rect l="0" t="0" r="0" b="0"/>
-          <a:pathLst>
-            <a:path>
-              <a:moveTo>
-                <a:pt x="0" y="0"/>
-              </a:moveTo>
-              <a:lnTo>
-                <a:pt x="0" y="3729372"/>
-              </a:lnTo>
-              <a:lnTo>
-                <a:pt x="215986" y="3729372"/>
-              </a:lnTo>
-            </a:path>
-          </a:pathLst>
-        </a:custGeom>
-        <a:noFill/>
-        <a:ln w="12700" cap="flat" cmpd="sng" algn="ctr">
-          <a:solidFill>
-            <a:schemeClr val="accent6">
-              <a:hueOff val="0"/>
-              <a:satOff val="0"/>
-              <a:lumOff val="0"/>
-              <a:alphaOff val="0"/>
-            </a:schemeClr>
-          </a:solidFill>
-          <a:prstDash val="solid"/>
-          <a:miter lim="800000"/>
-        </a:ln>
-        <a:effectLst/>
-      </dsp:spPr>
-      <dsp:style>
-        <a:lnRef idx="2">
-          <a:scrgbClr r="0" g="0" b="0"/>
-        </a:lnRef>
-        <a:fillRef idx="0">
-          <a:scrgbClr r="0" g="0" b="0"/>
-        </a:fillRef>
-        <a:effectRef idx="0">
-          <a:scrgbClr r="0" g="0" b="0"/>
-        </a:effectRef>
-        <a:fontRef idx="minor"/>
-      </dsp:style>
-    </dsp:sp>
-    <dsp:sp modelId="{15A61DF0-AC49-4E69-9546-90778A86DEB3}">
-      <dsp:nvSpPr>
-        <dsp:cNvPr id="0" name=""/>
-        <dsp:cNvSpPr/>
-      </dsp:nvSpPr>
-      <dsp:spPr>
-        <a:xfrm>
-          <a:off x="4687192" y="2766640"/>
           <a:ext cx="215986" cy="2707034"/>
         </a:xfrm>
         <a:custGeom>
@@ -3272,7 +2956,7 @@
         <a:fontRef idx="minor"/>
       </dsp:style>
     </dsp:sp>
-    <dsp:sp modelId="{4FC84424-77B3-4BAD-A376-197D931F1926}">
+    <dsp:sp modelId="{15A61DF0-AC49-4E69-9546-90778A86DEB3}">
       <dsp:nvSpPr>
         <dsp:cNvPr id="0" name=""/>
         <dsp:cNvSpPr/>
@@ -3330,7 +3014,7 @@
         <a:fontRef idx="minor"/>
       </dsp:style>
     </dsp:sp>
-    <dsp:sp modelId="{F2A0CB5F-BBE7-4880-9B72-74572386B4E4}">
+    <dsp:sp modelId="{4FC84424-77B3-4BAD-A376-197D931F1926}">
       <dsp:nvSpPr>
         <dsp:cNvPr id="0" name=""/>
         <dsp:cNvSpPr/>
@@ -4821,7 +4505,7 @@
         <a:ext cx="1439912" cy="719956"/>
       </dsp:txXfrm>
     </dsp:sp>
-    <dsp:sp modelId="{FF3BFF33-8FD3-4579-94E9-E5FEBB720C18}">
+    <dsp:sp modelId="{A2C33C9F-E20E-4D1E-BBFD-28AA5D38E75F}">
       <dsp:nvSpPr>
         <dsp:cNvPr id="0" name=""/>
         <dsp:cNvSpPr/>
@@ -4888,8 +4572,16 @@
             </a:spcAft>
           </a:pPr>
           <a:r>
-            <a:rPr lang="en-US" sz="1200" kern="1200"/>
-            <a:t>PMI</a:t>
+            <a:rPr lang="en-US" sz="1200" kern="1200" dirty="0" err="1" smtClean="0"/>
+            <a:t>QoQ</a:t>
+          </a:r>
+          <a:r>
+            <a:rPr lang="en-US" sz="1200" kern="1200" dirty="0" smtClean="0"/>
+            <a:t> </a:t>
+          </a:r>
+          <a:r>
+            <a:rPr lang="en-US" sz="1200" kern="1200" dirty="0"/>
+            <a:t>GDP Growth</a:t>
           </a:r>
         </a:p>
       </dsp:txBody>
@@ -4898,7 +4590,7 @@
         <a:ext cx="1439912" cy="719956"/>
       </dsp:txXfrm>
     </dsp:sp>
-    <dsp:sp modelId="{A2C33C9F-E20E-4D1E-BBFD-28AA5D38E75F}">
+    <dsp:sp modelId="{BEB8562A-B0BC-4237-ADB8-FF4D03EEE094}">
       <dsp:nvSpPr>
         <dsp:cNvPr id="0" name=""/>
         <dsp:cNvSpPr/>
@@ -4965,16 +4657,8 @@
             </a:spcAft>
           </a:pPr>
           <a:r>
-            <a:rPr lang="en-US" sz="1200" kern="1200" dirty="0" err="1" smtClean="0"/>
-            <a:t>QoQ</a:t>
-          </a:r>
-          <a:r>
-            <a:rPr lang="en-US" sz="1200" kern="1200" dirty="0" smtClean="0"/>
-            <a:t> </a:t>
-          </a:r>
-          <a:r>
-            <a:rPr lang="en-US" sz="1200" kern="1200" dirty="0"/>
-            <a:t>GDP Growth</a:t>
+            <a:rPr lang="en-US" sz="1200" kern="1200"/>
+            <a:t>Debt/GDP</a:t>
           </a:r>
         </a:p>
       </dsp:txBody>
@@ -4983,7 +4667,7 @@
         <a:ext cx="1439912" cy="719956"/>
       </dsp:txXfrm>
     </dsp:sp>
-    <dsp:sp modelId="{BEB8562A-B0BC-4237-ADB8-FF4D03EEE094}">
+    <dsp:sp modelId="{D441324F-5840-4545-95C8-58993D682F03}">
       <dsp:nvSpPr>
         <dsp:cNvPr id="0" name=""/>
         <dsp:cNvSpPr/>
@@ -5051,89 +4735,12 @@
           </a:pPr>
           <a:r>
             <a:rPr lang="en-US" sz="1200" kern="1200"/>
-            <a:t>Debt/GDP</a:t>
+            <a:t>REER</a:t>
           </a:r>
         </a:p>
       </dsp:txBody>
       <dsp:txXfrm>
         <a:off x="4903179" y="5113697"/>
-        <a:ext cx="1439912" cy="719956"/>
-      </dsp:txXfrm>
-    </dsp:sp>
-    <dsp:sp modelId="{D441324F-5840-4545-95C8-58993D682F03}">
-      <dsp:nvSpPr>
-        <dsp:cNvPr id="0" name=""/>
-        <dsp:cNvSpPr/>
-      </dsp:nvSpPr>
-      <dsp:spPr>
-        <a:xfrm>
-          <a:off x="4903179" y="6136035"/>
-          <a:ext cx="1439912" cy="719956"/>
-        </a:xfrm>
-        <a:prstGeom prst="rect">
-          <a:avLst/>
-        </a:prstGeom>
-        <a:solidFill>
-          <a:schemeClr val="accent6">
-            <a:hueOff val="0"/>
-            <a:satOff val="0"/>
-            <a:lumOff val="0"/>
-            <a:alphaOff val="0"/>
-          </a:schemeClr>
-        </a:solidFill>
-        <a:ln w="12700" cap="flat" cmpd="sng" algn="ctr">
-          <a:solidFill>
-            <a:schemeClr val="lt1">
-              <a:hueOff val="0"/>
-              <a:satOff val="0"/>
-              <a:lumOff val="0"/>
-              <a:alphaOff val="0"/>
-            </a:schemeClr>
-          </a:solidFill>
-          <a:prstDash val="solid"/>
-          <a:miter lim="800000"/>
-        </a:ln>
-        <a:effectLst/>
-      </dsp:spPr>
-      <dsp:style>
-        <a:lnRef idx="2">
-          <a:scrgbClr r="0" g="0" b="0"/>
-        </a:lnRef>
-        <a:fillRef idx="1">
-          <a:scrgbClr r="0" g="0" b="0"/>
-        </a:fillRef>
-        <a:effectRef idx="0">
-          <a:scrgbClr r="0" g="0" b="0"/>
-        </a:effectRef>
-        <a:fontRef idx="minor">
-          <a:schemeClr val="lt1"/>
-        </a:fontRef>
-      </dsp:style>
-      <dsp:txBody>
-        <a:bodyPr spcFirstLastPara="0" vert="horz" wrap="square" lIns="7620" tIns="7620" rIns="7620" bIns="7620" numCol="1" spcCol="1270" anchor="ctr" anchorCtr="0">
-          <a:noAutofit/>
-        </a:bodyPr>
-        <a:lstStyle/>
-        <a:p>
-          <a:pPr lvl="0" algn="ctr" defTabSz="533400">
-            <a:lnSpc>
-              <a:spcPct val="90000"/>
-            </a:lnSpc>
-            <a:spcBef>
-              <a:spcPct val="0"/>
-            </a:spcBef>
-            <a:spcAft>
-              <a:spcPct val="35000"/>
-            </a:spcAft>
-          </a:pPr>
-          <a:r>
-            <a:rPr lang="en-US" sz="1200" kern="1200"/>
-            <a:t>REER</a:t>
-          </a:r>
-        </a:p>
-      </dsp:txBody>
-      <dsp:txXfrm>
-        <a:off x="4903179" y="6136035"/>
         <a:ext cx="1439912" cy="719956"/>
       </dsp:txXfrm>
     </dsp:sp>
@@ -5204,8 +4811,16 @@
             </a:spcAft>
           </a:pPr>
           <a:r>
-            <a:rPr lang="en-US" sz="1200" kern="1200"/>
-            <a:t>Market sentiment and alternative score</a:t>
+            <a:rPr lang="en-US" sz="1200" kern="1200" dirty="0"/>
+            <a:t>Market </a:t>
+          </a:r>
+          <a:r>
+            <a:rPr lang="en-US" sz="1200" kern="1200" dirty="0" smtClean="0"/>
+            <a:t>sentimental </a:t>
+          </a:r>
+          <a:r>
+            <a:rPr lang="en-US" sz="1200" kern="1200" dirty="0"/>
+            <a:t>and alternative score</a:t>
           </a:r>
         </a:p>
       </dsp:txBody>
@@ -5365,83 +4980,6 @@
       </dsp:txBody>
       <dsp:txXfrm>
         <a:off x="6645473" y="4091360"/>
-        <a:ext cx="1439912" cy="719956"/>
-      </dsp:txXfrm>
-    </dsp:sp>
-    <dsp:sp modelId="{7ED97DFD-2695-4177-9E52-49490FD3D0C7}">
-      <dsp:nvSpPr>
-        <dsp:cNvPr id="0" name=""/>
-        <dsp:cNvSpPr/>
-      </dsp:nvSpPr>
-      <dsp:spPr>
-        <a:xfrm>
-          <a:off x="6645473" y="5113697"/>
-          <a:ext cx="1439912" cy="719956"/>
-        </a:xfrm>
-        <a:prstGeom prst="rect">
-          <a:avLst/>
-        </a:prstGeom>
-        <a:solidFill>
-          <a:schemeClr val="accent6">
-            <a:hueOff val="0"/>
-            <a:satOff val="0"/>
-            <a:lumOff val="0"/>
-            <a:alphaOff val="0"/>
-          </a:schemeClr>
-        </a:solidFill>
-        <a:ln w="12700" cap="flat" cmpd="sng" algn="ctr">
-          <a:solidFill>
-            <a:schemeClr val="lt1">
-              <a:hueOff val="0"/>
-              <a:satOff val="0"/>
-              <a:lumOff val="0"/>
-              <a:alphaOff val="0"/>
-            </a:schemeClr>
-          </a:solidFill>
-          <a:prstDash val="solid"/>
-          <a:miter lim="800000"/>
-        </a:ln>
-        <a:effectLst/>
-      </dsp:spPr>
-      <dsp:style>
-        <a:lnRef idx="2">
-          <a:scrgbClr r="0" g="0" b="0"/>
-        </a:lnRef>
-        <a:fillRef idx="1">
-          <a:scrgbClr r="0" g="0" b="0"/>
-        </a:fillRef>
-        <a:effectRef idx="0">
-          <a:scrgbClr r="0" g="0" b="0"/>
-        </a:effectRef>
-        <a:fontRef idx="minor">
-          <a:schemeClr val="lt1"/>
-        </a:fontRef>
-      </dsp:style>
-      <dsp:txBody>
-        <a:bodyPr spcFirstLastPara="0" vert="horz" wrap="square" lIns="7620" tIns="7620" rIns="7620" bIns="7620" numCol="1" spcCol="1270" anchor="ctr" anchorCtr="0">
-          <a:noAutofit/>
-        </a:bodyPr>
-        <a:lstStyle/>
-        <a:p>
-          <a:pPr lvl="0" algn="ctr" defTabSz="533400">
-            <a:lnSpc>
-              <a:spcPct val="90000"/>
-            </a:lnSpc>
-            <a:spcBef>
-              <a:spcPct val="0"/>
-            </a:spcBef>
-            <a:spcAft>
-              <a:spcPct val="35000"/>
-            </a:spcAft>
-          </a:pPr>
-          <a:r>
-            <a:rPr lang="en-US" sz="1200" kern="1200"/>
-            <a:t>Fund flow</a:t>
-          </a:r>
-        </a:p>
-      </dsp:txBody>
-      <dsp:txXfrm>
-        <a:off x="6645473" y="5113697"/>
         <a:ext cx="1439912" cy="719956"/>
       </dsp:txXfrm>
     </dsp:sp>
@@ -10493,7 +10031,7 @@
           <p:cNvPr id="7" name="Diagram 6">
             <a:extLst>
               <a:ext uri="{FF2B5EF4-FFF2-40B4-BE49-F238E27FC236}">
-                <a16:creationId xmlns:a16="http://schemas.microsoft.com/office/drawing/2014/main" xmlns="" id="{C13B09F0-C816-467D-ABDE-89599B29D4E9}"/>
+                <a16:creationId xmlns="" xmlns:a16="http://schemas.microsoft.com/office/drawing/2014/main" id="{C13B09F0-C816-467D-ABDE-89599B29D4E9}"/>
               </a:ext>
             </a:extLst>
           </p:cNvPr>
@@ -10501,7 +10039,7 @@
           <p:nvPr>
             <p:extLst>
               <p:ext uri="{D42A27DB-BD31-4B8C-83A1-F6EECF244321}">
-                <p14:modId xmlns:p14="http://schemas.microsoft.com/office/powerpoint/2010/main" val="316973942"/>
+                <p14:modId xmlns:p14="http://schemas.microsoft.com/office/powerpoint/2010/main" val="4008982540"/>
               </p:ext>
             </p:extLst>
           </p:nvPr>
@@ -10784,7 +10322,7 @@
   <a:extraClrSchemeLst/>
   <a:extLst>
     <a:ext uri="{05A4C25C-085E-4340-85A3-A5531E510DB2}">
-      <thm15:themeFamily xmlns:thm15="http://schemas.microsoft.com/office/thememl/2012/main" xmlns="" name="Office Theme" id="{62F939B6-93AF-4DB8-9C6B-D6C7DFDC589F}" vid="{4A3C46E8-61CC-4603-A589-7422A47A8E4A}"/>
+      <thm15:themeFamily xmlns="" xmlns:thm15="http://schemas.microsoft.com/office/thememl/2012/main" name="Office Theme" id="{62F939B6-93AF-4DB8-9C6B-D6C7DFDC589F}" vid="{4A3C46E8-61CC-4603-A589-7422A47A8E4A}"/>
     </a:ext>
   </a:extLst>
 </a:theme>

</xml_diff>